<commit_message>
De titel van M02 is veranderd van 'Het project zorgt dat het product continu aan de kwaliteitsnormen voldoet' in 'Het project bewaakt continu dat het product aan de kwaliteitsnormen voldoet'. Continue aan alle kwaliteitsnormen voldoen is in de praktijk onmogelijk (zie ook M08 'Het project maakt technische schuld inzichtelijk en lost deze planmatig op'). Hiermee is de overlap met M06 'Het project meet kwaliteitsnormen geautomatiseerd en frequent' zo groot dat deze laatste maatregel is komen te vervallen. Closes #688.
</commit_message>
<xml_diff>
--- a/docs/wip/ICTU-Kwaliteitsaanpak.pptx
+++ b/docs/wip/ICTU-Kwaliteitsaanpak.pptx
@@ -41,7 +41,6 @@
     <p:sldId id="285" r:id="rId42"/>
     <p:sldId id="286" r:id="rId43"/>
     <p:sldId id="287" r:id="rId44"/>
-    <p:sldId id="288" r:id="rId45"/>
   </p:sldIdLst>
   <p:sldSz cx="12192000" cy="6858000"/>
   <p:notesSz cx="6858000" cy="9144000"/>
@@ -21265,7 +21264,7 @@
               <a:buNone/>
             </a:pPr>
             <a:r>
-              <a:t>Versie 3.1.0-dev, 06-06-2023</a:t>
+              <a:t>Versie 4.0.0-dev, 06-06-2023</a:t>
             </a:r>
           </a:p>
         </p:txBody>
@@ -22074,7 +22073,7 @@
               <a:defRPr sz="2400"/>
             </a:pPr>
             <a:r>
-              <a:t>M06: Het project meet kwaliteitsnormen geautomatiseerd en frequent</a:t>
+              <a:t>M10: Het project kent een wekelijks projectoverleg</a:t>
             </a:r>
           </a:p>
         </p:txBody>
@@ -22102,7 +22101,7 @@
           <a:lstStyle/>
           <a:p>
             <a:r>
-              <a:t>Het voldoen aan de kwaliteitsnormen die geautomatiseerd gemeten kunnen worden, wordt frequent en minimaal één keer per dag gemeten.</a:t>
+              <a:t>De projectleider organiseert een periodiek projectoverleg. Dit overleg vindt wekelijks plaats en duurt niet langer dan een uur. Vereiste aanwezigen zijn de projectleider, de software delivery manager, de Scrummaster, een vertegenwoordiger uit elk van de Scrumteams en de kwaliteitsmanager van het project; andere aanwezigen kunnen zijn: de projectarchitect en de product owner. De agenda voor dit overleg bestaat ten minste uit de volgende onderwerpen: mededelingen, actie- en besluitenlijst, personele zaken, planning en voortgang, kwaliteit en architectuur, risico's en aandachtspunten.</a:t>
             </a:r>
           </a:p>
         </p:txBody>
@@ -22144,7 +22143,7 @@
               <a:defRPr sz="2400"/>
             </a:pPr>
             <a:r>
-              <a:t>M10: Het project kent een wekelijks projectoverleg</a:t>
+              <a:t>M16: Het project gebruikt tools voor vastgestelde taken</a:t>
             </a:r>
           </a:p>
         </p:txBody>
@@ -22172,7 +22171,127 @@
           <a:lstStyle/>
           <a:p>
             <a:r>
-              <a:t>De projectleider organiseert een periodiek projectoverleg. Dit overleg vindt wekelijks plaats en duurt niet langer dan een uur. Vereiste aanwezigen zijn de projectleider, de software delivery manager, de Scrummaster, een vertegenwoordiger uit elk van de Scrumteams en de kwaliteitsmanager van het project; andere aanwezigen kunnen zijn: de projectarchitect en de product owner. De agenda voor dit overleg bestaat ten minste uit de volgende onderwerpen: mededelingen, actie- en besluitenlijst, personele zaken, planning en voortgang, kwaliteit en architectuur, risico's en aandachtspunten.</a:t>
+              <a:t>ICTU stelt het gebruik van tools verplicht voor:</a:t>
+            </a:r>
+          </a:p>
+          <a:p>
+            <a:pPr>
+              <a:defRPr sz="2000"/>
+            </a:pPr>
+            <a:r>
+              <a:t>backlog management en agile werken,</a:t>
+            </a:r>
+          </a:p>
+          <a:p>
+            <a:pPr>
+              <a:defRPr sz="2000"/>
+            </a:pPr>
+            <a:r>
+              <a:t>inrichten en uitvoeren van een continuous delivery pipeline,</a:t>
+            </a:r>
+          </a:p>
+          <a:p>
+            <a:pPr>
+              <a:defRPr sz="2000"/>
+            </a:pPr>
+            <a:r>
+              <a:t>monitoren van de kwaliteit van broncode,</a:t>
+            </a:r>
+          </a:p>
+          <a:p>
+            <a:pPr>
+              <a:defRPr sz="2000"/>
+            </a:pPr>
+            <a:r>
+              <a:t>versiebeheer van op te leveren producten,</a:t>
+            </a:r>
+          </a:p>
+          <a:p>
+            <a:pPr>
+              <a:defRPr sz="2000"/>
+            </a:pPr>
+            <a:r>
+              <a:t>release van software,</a:t>
+            </a:r>
+          </a:p>
+          <a:p>
+            <a:pPr>
+              <a:defRPr sz="2000"/>
+            </a:pPr>
+            <a:r>
+              <a:t>maken van testrapportages,</a:t>
+            </a:r>
+          </a:p>
+          <a:p>
+            <a:pPr>
+              <a:defRPr sz="2000"/>
+            </a:pPr>
+            <a:r>
+              <a:t>maken van kwaliteitsrapportages,</a:t>
+            </a:r>
+          </a:p>
+          <a:p>
+            <a:pPr>
+              <a:defRPr sz="2000"/>
+            </a:pPr>
+            <a:r>
+              <a:t>controleren van de configuratie op aanwezigheid van bekende kwetsbaarheden,</a:t>
+            </a:r>
+          </a:p>
+          <a:p>
+            <a:pPr>
+              <a:defRPr sz="2000"/>
+            </a:pPr>
+            <a:r>
+              <a:t>controleren van door de applicatie gebruikte versies van externe software op aanwezigheid van bekende kwetsbaarheden,</a:t>
+            </a:r>
+          </a:p>
+          <a:p>
+            <a:pPr>
+              <a:defRPr sz="2000"/>
+            </a:pPr>
+            <a:r>
+              <a:t>controleren van de software op aanwezigheid van kwetsbare constructies,</a:t>
+            </a:r>
+          </a:p>
+          <a:p>
+            <a:pPr>
+              <a:defRPr sz="2000"/>
+            </a:pPr>
+            <a:r>
+              <a:t>controleren van container images op aanwezigheid van bekende kwetsbaarheden,</a:t>
+            </a:r>
+          </a:p>
+          <a:p>
+            <a:pPr>
+              <a:defRPr sz="2000"/>
+            </a:pPr>
+            <a:r>
+              <a:t>testen van performance en schaalbaarheid,</a:t>
+            </a:r>
+          </a:p>
+          <a:p>
+            <a:pPr>
+              <a:defRPr sz="2000"/>
+            </a:pPr>
+            <a:r>
+              <a:t>testen op toegankelijkheid van de applicatie,</a:t>
+            </a:r>
+          </a:p>
+          <a:p>
+            <a:pPr>
+              <a:defRPr sz="2000"/>
+            </a:pPr>
+            <a:r>
+              <a:t>produceren van een "software bill of materials" (SBoM) en</a:t>
+            </a:r>
+          </a:p>
+          <a:p>
+            <a:pPr>
+              <a:defRPr sz="2000"/>
+            </a:pPr>
+            <a:r>
+              <a:t>opslaan van artifacten.</a:t>
             </a:r>
           </a:p>
         </p:txBody>
@@ -22214,7 +22333,7 @@
               <a:defRPr sz="2400"/>
             </a:pPr>
             <a:r>
-              <a:t>M16: Het project gebruikt tools voor vastgestelde taken</a:t>
+              <a:t>M28: Het project voert periodiek een self-assessment uit tegen de actuele versie van de Kwaliteitsaanpak</a:t>
             </a:r>
           </a:p>
         </p:txBody>
@@ -22242,127 +22361,7 @@
           <a:lstStyle/>
           <a:p>
             <a:r>
-              <a:t>ICTU stelt het gebruik van tools verplicht voor:</a:t>
-            </a:r>
-          </a:p>
-          <a:p>
-            <a:pPr>
-              <a:defRPr sz="2000"/>
-            </a:pPr>
-            <a:r>
-              <a:t>backlog management en agile werken,</a:t>
-            </a:r>
-          </a:p>
-          <a:p>
-            <a:pPr>
-              <a:defRPr sz="2000"/>
-            </a:pPr>
-            <a:r>
-              <a:t>inrichten en uitvoeren van een continuous delivery pipeline,</a:t>
-            </a:r>
-          </a:p>
-          <a:p>
-            <a:pPr>
-              <a:defRPr sz="2000"/>
-            </a:pPr>
-            <a:r>
-              <a:t>monitoren van de kwaliteit van broncode,</a:t>
-            </a:r>
-          </a:p>
-          <a:p>
-            <a:pPr>
-              <a:defRPr sz="2000"/>
-            </a:pPr>
-            <a:r>
-              <a:t>versiebeheer van op te leveren producten,</a:t>
-            </a:r>
-          </a:p>
-          <a:p>
-            <a:pPr>
-              <a:defRPr sz="2000"/>
-            </a:pPr>
-            <a:r>
-              <a:t>release van software,</a:t>
-            </a:r>
-          </a:p>
-          <a:p>
-            <a:pPr>
-              <a:defRPr sz="2000"/>
-            </a:pPr>
-            <a:r>
-              <a:t>maken van testrapportages,</a:t>
-            </a:r>
-          </a:p>
-          <a:p>
-            <a:pPr>
-              <a:defRPr sz="2000"/>
-            </a:pPr>
-            <a:r>
-              <a:t>maken van kwaliteitsrapportages,</a:t>
-            </a:r>
-          </a:p>
-          <a:p>
-            <a:pPr>
-              <a:defRPr sz="2000"/>
-            </a:pPr>
-            <a:r>
-              <a:t>controleren van de configuratie op aanwezigheid van bekende kwetsbaarheden,</a:t>
-            </a:r>
-          </a:p>
-          <a:p>
-            <a:pPr>
-              <a:defRPr sz="2000"/>
-            </a:pPr>
-            <a:r>
-              <a:t>controleren van door de applicatie gebruikte versies van externe software op aanwezigheid van bekende kwetsbaarheden,</a:t>
-            </a:r>
-          </a:p>
-          <a:p>
-            <a:pPr>
-              <a:defRPr sz="2000"/>
-            </a:pPr>
-            <a:r>
-              <a:t>controleren van de software op aanwezigheid van kwetsbare constructies,</a:t>
-            </a:r>
-          </a:p>
-          <a:p>
-            <a:pPr>
-              <a:defRPr sz="2000"/>
-            </a:pPr>
-            <a:r>
-              <a:t>controleren van container images op aanwezigheid van bekende kwetsbaarheden,</a:t>
-            </a:r>
-          </a:p>
-          <a:p>
-            <a:pPr>
-              <a:defRPr sz="2000"/>
-            </a:pPr>
-            <a:r>
-              <a:t>testen van performance en schaalbaarheid,</a:t>
-            </a:r>
-          </a:p>
-          <a:p>
-            <a:pPr>
-              <a:defRPr sz="2000"/>
-            </a:pPr>
-            <a:r>
-              <a:t>testen op toegankelijkheid van de applicatie,</a:t>
-            </a:r>
-          </a:p>
-          <a:p>
-            <a:pPr>
-              <a:defRPr sz="2000"/>
-            </a:pPr>
-            <a:r>
-              <a:t>produceren van een "software bill of materials" (SBoM) en</a:t>
-            </a:r>
-          </a:p>
-          <a:p>
-            <a:pPr>
-              <a:defRPr sz="2000"/>
-            </a:pPr>
-            <a:r>
-              <a:t>opslaan van artifacten.</a:t>
+              <a:t>De projectleider organiseert periodiek een self-assessment tegen de actuele versie van de Kwaliteitsaanpak en zet verbeteracties uit, waar nodig.</a:t>
             </a:r>
           </a:p>
         </p:txBody>
@@ -22404,7 +22403,7 @@
               <a:defRPr sz="2400"/>
             </a:pPr>
             <a:r>
-              <a:t>M28: Het project voert periodiek een self-assessment uit tegen de actuele versie van de Kwaliteitsaanpak</a:t>
+              <a:t>M30: Het project identificeert, mitigeert en bewaakt risico's</a:t>
             </a:r>
           </a:p>
         </p:txBody>
@@ -22432,7 +22431,7 @@
           <a:lstStyle/>
           <a:p>
             <a:r>
-              <a:t>De projectleider organiseert periodiek een self-assessment tegen de actuele versie van de Kwaliteitsaanpak en zet verbeteracties uit, waar nodig.</a:t>
+              <a:t>Het project identificeert, mitigeert en bewaakt projectspecifieke risico's voorafgaand aan en tijdens de projectuitvoering. Het project houdt een risicolog bij met geïdentificeerde risico's. De uitkomsten van de "Doordacht-van-Start-sessie", die al voorafgaand aan de start van het project wordt uitgevoerd, vormen het startpunt van deze risicolog. Risico's die tijdens de voorfase worden geïdentificeerd, bijvoorbeeld bij de productrisicoanalyse, worden toegevoegd aan de risicolog. Ook bij de start van de realisatiefase worden risicosessies gehouden met (vertegenwoordigers van) de belanghebbenden om verdere risico's te identificeren. Het project identificeert en implementeert mitigerende maatregelen danwel accepteert expliciet de geïdentificeerde risico's. Het project bewaakt de risicolog en uitvoering van de mitigerende maatregelen tijdens het IPO.</a:t>
             </a:r>
           </a:p>
         </p:txBody>
@@ -22474,7 +22473,7 @@
               <a:defRPr sz="2400"/>
             </a:pPr>
             <a:r>
-              <a:t>M30: Het project identificeert, mitigeert en bewaakt risico's</a:t>
+              <a:t>M34: Het project draagt software beheerst over</a:t>
             </a:r>
           </a:p>
         </p:txBody>
@@ -22502,7 +22501,7 @@
           <a:lstStyle/>
           <a:p>
             <a:r>
-              <a:t>Het project identificeert, mitigeert en bewaakt projectspecifieke risico's voorafgaand aan en tijdens de projectuitvoering. Het project houdt een risicolog bij met geïdentificeerde risico's. De uitkomsten van de "Doordacht-van-Start-sessie", die al voorafgaand aan de start van het project wordt uitgevoerd, vormen het startpunt van deze risicolog. Risico's die tijdens de voorfase worden geïdentificeerd, bijvoorbeeld bij de productrisicoanalyse, worden toegevoegd aan de risicolog. Ook bij de start van de realisatiefase worden risicosessies gehouden met (vertegenwoordigers van) de belanghebbenden om verdere risico's te identificeren. Het project identificeert en implementeert mitigerende maatregelen danwel accepteert expliciet de geïdentificeerde risico's. Het project bewaakt de risicolog en uitvoering van de mitigerende maatregelen tijdens het IPO.</a:t>
+              <a:t>Als de software op enig moment door een andere partij dan ICTU verder ontwikkeld en/of onderhouden zal worden, draagt het project zorg voor een beheerste overdracht. Beheerdocumentatie, broncode en testmiddelen zijn van dusdanige kwaliteit en compleetheid dat de andere partij de software efficiënt en effectief kan doorontwikkelen en/of onderhouden.</a:t>
             </a:r>
           </a:p>
         </p:txBody>
@@ -22544,7 +22543,7 @@
               <a:defRPr sz="2400"/>
             </a:pPr>
             <a:r>
-              <a:t>M34: Het project draagt software beheerst over</a:t>
+              <a:t>M27: Het project sluit projectfasen en zichzelf expliciet af</a:t>
             </a:r>
           </a:p>
         </p:txBody>
@@ -22572,7 +22571,7 @@
           <a:lstStyle/>
           <a:p>
             <a:r>
-              <a:t>Als de software op enig moment door een andere partij dan ICTU verder ontwikkeld en/of onderhouden zal worden, draagt het project zorg voor een beheerste overdracht. Beheerdocumentatie, broncode en testmiddelen zijn van dusdanige kwaliteit en compleetheid dat de andere partij de software efficiënt en effectief kan doorontwikkelen en/of onderhouden.</a:t>
+              <a:t>Afsluiting van een projectfase gebeurt expliciet en gecontroleerd: alle producten, zoals documentatie, broncode, referentiedata en credentials, die in de af te sluiten fase nodig waren of zijn opgeleverd, worden gearchiveerd. Indien er geen volgende fase is voorzien op korte termijn, dienen alle producten van de laptops van de projectmedewerkers verwijderd te worden.</a:t>
             </a:r>
           </a:p>
         </p:txBody>
@@ -22610,41 +22609,27 @@
           <a:bodyPr/>
           <a:lstStyle/>
           <a:p>
-            <a:pPr>
-              <a:defRPr sz="2400"/>
-            </a:pPr>
             <a:r>
-              <a:t>M27: Het project sluit projectfasen en zichzelf expliciet af</a:t>
+              <a:t>Organisatie</a:t>
             </a:r>
           </a:p>
         </p:txBody>
       </p:sp>
       <p:sp>
         <p:nvSpPr>
-          <p:cNvPr id="3" name="TextBox 2"/>
-          <p:cNvSpPr txBox="1"/>
-          <p:nvPr/>
-        </p:nvSpPr>
-        <p:spPr>
-          <a:xfrm>
-            <a:off x="640080" y="1463040"/>
-            <a:ext cx="10972800" cy="5486400"/>
-          </a:xfrm>
-          <a:prstGeom prst="rect">
-            <a:avLst/>
-          </a:prstGeom>
-          <a:noFill/>
-        </p:spPr>
-        <p:txBody>
-          <a:bodyPr wrap="square">
-            <a:spAutoFit/>
-          </a:bodyPr>
+          <p:cNvPr id="3" name="Text Placeholder 2"/>
+          <p:cNvSpPr>
+            <a:spLocks noGrp="1"/>
+          </p:cNvSpPr>
+          <p:nvPr>
+            <p:ph type="body" idx="10" sz="quarter"/>
+          </p:nvPr>
+        </p:nvSpPr>
+        <p:spPr/>
+        <p:txBody>
+          <a:bodyPr/>
           <a:lstStyle/>
-          <a:p>
-            <a:r>
-              <a:t>Afsluiting van een projectfase gebeurt expliciet en gecontroleerd: alle producten, zoals documentatie, broncode, referentiedata en credentials, die in de af te sluiten fase nodig waren of zijn opgeleverd, worden gearchiveerd. Indien er geen volgende fase is voorzien op korte termijn, dienen alle producten van de laptops van de projectmedewerkers verwijderd te worden.</a:t>
-            </a:r>
-          </a:p>
+          <a:p/>
         </p:txBody>
       </p:sp>
     </p:spTree>
@@ -22680,27 +22665,41 @@
           <a:bodyPr/>
           <a:lstStyle/>
           <a:p>
+            <a:pPr>
+              <a:defRPr sz="2400"/>
+            </a:pPr>
             <a:r>
-              <a:t>Organisatie</a:t>
+              <a:t>M29: ICTU organiseert voor aanvang van een project de interne dienstverlening</a:t>
             </a:r>
           </a:p>
         </p:txBody>
       </p:sp>
       <p:sp>
         <p:nvSpPr>
-          <p:cNvPr id="3" name="Text Placeholder 2"/>
-          <p:cNvSpPr>
-            <a:spLocks noGrp="1"/>
-          </p:cNvSpPr>
-          <p:nvPr>
-            <p:ph type="body" idx="10" sz="quarter"/>
-          </p:nvPr>
-        </p:nvSpPr>
-        <p:spPr/>
-        <p:txBody>
-          <a:bodyPr/>
+          <p:cNvPr id="3" name="TextBox 2"/>
+          <p:cNvSpPr txBox="1"/>
+          <p:nvPr/>
+        </p:nvSpPr>
+        <p:spPr>
+          <a:xfrm>
+            <a:off x="640080" y="1463040"/>
+            <a:ext cx="10972800" cy="5486400"/>
+          </a:xfrm>
+          <a:prstGeom prst="rect">
+            <a:avLst/>
+          </a:prstGeom>
+          <a:noFill/>
+        </p:spPr>
+        <p:txBody>
+          <a:bodyPr wrap="square">
+            <a:spAutoFit/>
+          </a:bodyPr>
           <a:lstStyle/>
-          <a:p/>
+          <a:p>
+            <a:r>
+              <a:t>Voordat ICTU een softwareontwikkelproject start, dat gaat werken conform de Kwaliteitsaanpak, maakt de beoogde projectleider afspraken met de afdelingen ICTU Software Diensten (ISD) en ICTU Software Expertise (ISE) over de af te nemen dienstverlening.</a:t>
+            </a:r>
+          </a:p>
         </p:txBody>
       </p:sp>
     </p:spTree>
@@ -22740,7 +22739,7 @@
               <a:defRPr sz="2400"/>
             </a:pPr>
             <a:r>
-              <a:t>M29: ICTU organiseert voor aanvang van een project de interne dienstverlening</a:t>
+              <a:t>M19: ICTU biedt projecten een afgeschermde digitale omgeving</a:t>
             </a:r>
           </a:p>
         </p:txBody>
@@ -22768,7 +22767,7 @@
           <a:lstStyle/>
           <a:p>
             <a:r>
-              <a:t>Voordat ICTU een softwareontwikkelproject start, dat gaat werken conform de Kwaliteitsaanpak, maakt de beoogde projectleider afspraken met de afdelingen ICTU Software Diensten (ISD) en ICTU Software Expertise (ISE) over de af te nemen dienstverlening.</a:t>
+              <a:t>ICTU geeft de projecten de beschikking over eigen, afgeschermde digitale omgevingen, waarbinnen ze de door het project ontwikkelde software en tools kunnen installeren en waartoe op een beheerste manier toegang wordt verleend.</a:t>
             </a:r>
           </a:p>
         </p:txBody>
@@ -22810,7 +22809,7 @@
               <a:defRPr sz="2400"/>
             </a:pPr>
             <a:r>
-              <a:t>M19: ICTU biedt projecten een afgeschermde digitale omgeving</a:t>
+              <a:t>M18: ICTU biedt ondersteuning voor verplicht gestelde tools</a:t>
             </a:r>
           </a:p>
         </p:txBody>
@@ -22838,7 +22837,7 @@
           <a:lstStyle/>
           <a:p>
             <a:r>
-              <a:t>ICTU geeft de projecten de beschikking over eigen, afgeschermde digitale omgevingen, waarbinnen ze de door het project ontwikkelde software en tools kunnen installeren en waartoe op een beheerste manier toegang wordt verleend.</a:t>
+              <a:t>ICTU zorgt voor technische en functionele ondersteuning aan projecten bij het gebruik van alle verplichte tools.</a:t>
             </a:r>
           </a:p>
         </p:txBody>
@@ -22953,7 +22952,7 @@
               <a:defRPr sz="2400"/>
             </a:pPr>
             <a:r>
-              <a:t>M18: ICTU biedt ondersteuning voor verplicht gestelde tools</a:t>
+              <a:t>M11: ICTU beheert, onderhoudt en implementeert de Kwaliteitsaanpak en kwaliteitsnormen</a:t>
             </a:r>
           </a:p>
         </p:txBody>
@@ -22981,7 +22980,7 @@
           <a:lstStyle/>
           <a:p>
             <a:r>
-              <a:t>ICTU zorgt voor technische en functionele ondersteuning aan projecten bij het gebruik van alle verplichte tools.</a:t>
+              <a:t>ICTU beheert, onderhoudt en implementeert de Kwaliteitsaanpak en de kwaliteitsnormen. Aanpassingen zijn gebaseerd op praktijkervaring, nieuwe inzichten en nieuwe mogelijkheden voor meting en analyse. Iedere medewerker kan wijzigingsvoorstellen indienen bij ICTU. ICTU behandelt de wijzigingsvoorstellen, kiest de te nemen actie bij elk wijzigingsvoorstel en legt de wijzigingsvoorstellen en besluiten vast.</a:t>
             </a:r>
           </a:p>
         </p:txBody>
@@ -23023,7 +23022,7 @@
               <a:defRPr sz="2400"/>
             </a:pPr>
             <a:r>
-              <a:t>M11: ICTU beheert, onderhoudt en implementeert de Kwaliteitsaanpak en kwaliteitsnormen</a:t>
+              <a:t>M12: ICTU publiceert nieuwe versies van de Kwaliteitsaanpak en normen periodiek en op een vaste locatie</a:t>
             </a:r>
           </a:p>
         </p:txBody>
@@ -23051,7 +23050,7 @@
           <a:lstStyle/>
           <a:p>
             <a:r>
-              <a:t>ICTU beheert, onderhoudt en implementeert de Kwaliteitsaanpak en de kwaliteitsnormen. Aanpassingen zijn gebaseerd op praktijkervaring, nieuwe inzichten en nieuwe mogelijkheden voor meting en analyse. Iedere medewerker kan wijzigingsvoorstellen indienen bij ICTU. ICTU behandelt de wijzigingsvoorstellen, kiest de te nemen actie bij elk wijzigingsvoorstel en legt de wijzigingsvoorstellen en besluiten vast.</a:t>
+              <a:t>ICTU publiceert periodiek een nieuwe versie van de Kwaliteitsaanpak en/of de kwaliteitsnormen op een vaste, bekende locatie.</a:t>
             </a:r>
           </a:p>
         </p:txBody>
@@ -23093,76 +23092,6 @@
               <a:defRPr sz="2400"/>
             </a:pPr>
             <a:r>
-              <a:t>M12: ICTU publiceert nieuwe versies van de Kwaliteitsaanpak en normen periodiek en op een vaste locatie</a:t>
-            </a:r>
-          </a:p>
-        </p:txBody>
-      </p:sp>
-      <p:sp>
-        <p:nvSpPr>
-          <p:cNvPr id="3" name="TextBox 2"/>
-          <p:cNvSpPr txBox="1"/>
-          <p:nvPr/>
-        </p:nvSpPr>
-        <p:spPr>
-          <a:xfrm>
-            <a:off x="640080" y="1463040"/>
-            <a:ext cx="10972800" cy="5486400"/>
-          </a:xfrm>
-          <a:prstGeom prst="rect">
-            <a:avLst/>
-          </a:prstGeom>
-          <a:noFill/>
-        </p:spPr>
-        <p:txBody>
-          <a:bodyPr wrap="square">
-            <a:spAutoFit/>
-          </a:bodyPr>
-          <a:lstStyle/>
-          <a:p>
-            <a:r>
-              <a:t>ICTU publiceert periodiek een nieuwe versie van de Kwaliteitsaanpak en/of de kwaliteitsnormen op een vaste, bekende locatie.</a:t>
-            </a:r>
-          </a:p>
-        </p:txBody>
-      </p:sp>
-    </p:spTree>
-  </p:cSld>
-  <p:clrMapOvr>
-    <a:masterClrMapping/>
-  </p:clrMapOvr>
-</p:sld>
-</file>
-
-<file path=ppt/slides/slide33.xml><?xml version="1.0" encoding="utf-8"?>
-<p:sld xmlns:a="http://schemas.openxmlformats.org/drawingml/2006/main" xmlns:p="http://schemas.openxmlformats.org/presentationml/2006/main" xmlns:r="http://schemas.openxmlformats.org/officeDocument/2006/relationships">
-  <p:cSld>
-    <p:spTree>
-      <p:nvGrpSpPr>
-        <p:cNvPr id="1" name=""/>
-        <p:cNvGrpSpPr/>
-        <p:nvPr/>
-      </p:nvGrpSpPr>
-      <p:grpSpPr/>
-      <p:sp>
-        <p:nvSpPr>
-          <p:cNvPr id="2" name="Title 1"/>
-          <p:cNvSpPr>
-            <a:spLocks noGrp="1"/>
-          </p:cNvSpPr>
-          <p:nvPr>
-            <p:ph type="title"/>
-          </p:nvPr>
-        </p:nvSpPr>
-        <p:spPr/>
-        <p:txBody>
-          <a:bodyPr/>
-          <a:lstStyle/>
-          <a:p>
-            <a:pPr>
-              <a:defRPr sz="2400"/>
-            </a:pPr>
-            <a:r>
               <a:t>M33: ICTU organiseert periodiek een gezamenlijke self-assessment ten aanzien van de Kwaliteitsaanpak</a:t>
             </a:r>
           </a:p>
@@ -23499,7 +23428,7 @@
               <a:defRPr sz="2400"/>
             </a:pPr>
             <a:r>
-              <a:t>M02: Het project zorgt dat het product continu aan de kwaliteitsnormen voldoet</a:t>
+              <a:t>M02: Het project bewaakt continu dat het product aan de kwaliteitsnormen voldoet</a:t>
             </a:r>
           </a:p>
         </p:txBody>
@@ -23527,7 +23456,7 @@
           <a:lstStyle/>
           <a:p>
             <a:r>
-              <a:t>Producten voldoen zo snel mogelijk vanaf de start van een project aan de door het project en ICTU vastgestelde kwaliteitsnormen en blijven daar zo veel mogelijk aan voldoen. De kwaliteit van producten, die nog niet zijn afgerond of nog niet aan de normen voldoen, wordt door het project bewaakt. Het voldoen aan de kwaliteitsnormen is onderdeel van de Definition of Done en herstel van de kwaliteit wordt planmatig opgepakt.</a:t>
+              <a:t>Projecten bewaken zo snel mogelijk vanaf de start de door het project en ICTU vastgestelde kwaliteitsnormen en voldoen daar zo snel en goed mogelijk aan. De kwaliteit van producten, die nog niet zijn afgerond of nog niet aan de normen voldoen, wordt door het project bewaakt. Het voldoen aan de kwaliteitsnormen is onderdeel van de Definition of Done en herstel van de kwaliteit wordt planmatig opgepakt.</a:t>
             </a:r>
           </a:p>
         </p:txBody>

</xml_diff>

<commit_message>
Maatregel M35 "Het project hanteert een agile architectuuraanpak" toegevoegd. Templates aangepast aan nieuwe maatregel. Closes #735.
</commit_message>
<xml_diff>
--- a/docs/wip/ICTU-Kwaliteitsaanpak.pptx
+++ b/docs/wip/ICTU-Kwaliteitsaanpak.pptx
@@ -41,6 +41,7 @@
     <p:sldId id="285" r:id="rId42"/>
     <p:sldId id="286" r:id="rId43"/>
     <p:sldId id="287" r:id="rId44"/>
+    <p:sldId id="288" r:id="rId45"/>
   </p:sldIdLst>
   <p:sldSz cx="12192000" cy="6858000"/>
   <p:notesSz cx="6858000" cy="9144000"/>
@@ -22073,7 +22074,7 @@
               <a:defRPr sz="2400"/>
             </a:pPr>
             <a:r>
-              <a:t>M10: Het project kent een wekelijks projectoverleg</a:t>
+              <a:t>M35: Het project hanteert een agile architectuuraanpak</a:t>
             </a:r>
           </a:p>
         </p:txBody>
@@ -22101,7 +22102,7 @@
           <a:lstStyle/>
           <a:p>
             <a:r>
-              <a:t>De projectleider organiseert een periodiek projectoverleg. Dit overleg vindt wekelijks plaats en duurt niet langer dan een uur. Vereiste aanwezigen zijn de projectleider, de software delivery manager, de Scrummaster, een vertegenwoordiger uit elk van de Scrumteams en de kwaliteitsmanager van het project; andere aanwezigen kunnen zijn: de projectarchitect en de product owner. De agenda voor dit overleg bestaat ten minste uit de volgende onderwerpen: mededelingen, actie- en besluitenlijst, personele zaken, planning en voortgang, kwaliteit en architectuur, risico's en aandachtspunten.</a:t>
+              <a:t>Tijdens de voorfase verwerkt het project de door de opdrachtgever opgestelde projectstartarchitectuur (PSA) in een eerste versie van het softwarearchitectuurdocument (SAD). Tijdens de realisatiefase werkt het project het SAD bij op basis van nieuwe inzichten.</a:t>
             </a:r>
           </a:p>
         </p:txBody>
@@ -22143,7 +22144,7 @@
               <a:defRPr sz="2400"/>
             </a:pPr>
             <a:r>
-              <a:t>M16: Het project gebruikt tools voor vastgestelde taken</a:t>
+              <a:t>M10: Het project kent een wekelijks projectoverleg</a:t>
             </a:r>
           </a:p>
         </p:txBody>
@@ -22171,127 +22172,7 @@
           <a:lstStyle/>
           <a:p>
             <a:r>
-              <a:t>ICTU stelt het gebruik van tools verplicht voor:</a:t>
-            </a:r>
-          </a:p>
-          <a:p>
-            <a:pPr>
-              <a:defRPr sz="2000"/>
-            </a:pPr>
-            <a:r>
-              <a:t>backlog management en agile werken,</a:t>
-            </a:r>
-          </a:p>
-          <a:p>
-            <a:pPr>
-              <a:defRPr sz="2000"/>
-            </a:pPr>
-            <a:r>
-              <a:t>inrichten en uitvoeren van een continuous delivery pipeline,</a:t>
-            </a:r>
-          </a:p>
-          <a:p>
-            <a:pPr>
-              <a:defRPr sz="2000"/>
-            </a:pPr>
-            <a:r>
-              <a:t>monitoren van de kwaliteit van broncode,</a:t>
-            </a:r>
-          </a:p>
-          <a:p>
-            <a:pPr>
-              <a:defRPr sz="2000"/>
-            </a:pPr>
-            <a:r>
-              <a:t>versiebeheer van op te leveren producten,</a:t>
-            </a:r>
-          </a:p>
-          <a:p>
-            <a:pPr>
-              <a:defRPr sz="2000"/>
-            </a:pPr>
-            <a:r>
-              <a:t>release van software,</a:t>
-            </a:r>
-          </a:p>
-          <a:p>
-            <a:pPr>
-              <a:defRPr sz="2000"/>
-            </a:pPr>
-            <a:r>
-              <a:t>maken van testrapportages,</a:t>
-            </a:r>
-          </a:p>
-          <a:p>
-            <a:pPr>
-              <a:defRPr sz="2000"/>
-            </a:pPr>
-            <a:r>
-              <a:t>maken van kwaliteitsrapportages,</a:t>
-            </a:r>
-          </a:p>
-          <a:p>
-            <a:pPr>
-              <a:defRPr sz="2000"/>
-            </a:pPr>
-            <a:r>
-              <a:t>controleren van de configuratie op aanwezigheid van bekende kwetsbaarheden,</a:t>
-            </a:r>
-          </a:p>
-          <a:p>
-            <a:pPr>
-              <a:defRPr sz="2000"/>
-            </a:pPr>
-            <a:r>
-              <a:t>controleren van door de applicatie gebruikte versies van externe software op aanwezigheid van bekende kwetsbaarheden,</a:t>
-            </a:r>
-          </a:p>
-          <a:p>
-            <a:pPr>
-              <a:defRPr sz="2000"/>
-            </a:pPr>
-            <a:r>
-              <a:t>controleren van de software op aanwezigheid van kwetsbare constructies,</a:t>
-            </a:r>
-          </a:p>
-          <a:p>
-            <a:pPr>
-              <a:defRPr sz="2000"/>
-            </a:pPr>
-            <a:r>
-              <a:t>controleren van container images op aanwezigheid van bekende kwetsbaarheden,</a:t>
-            </a:r>
-          </a:p>
-          <a:p>
-            <a:pPr>
-              <a:defRPr sz="2000"/>
-            </a:pPr>
-            <a:r>
-              <a:t>testen van performance en schaalbaarheid,</a:t>
-            </a:r>
-          </a:p>
-          <a:p>
-            <a:pPr>
-              <a:defRPr sz="2000"/>
-            </a:pPr>
-            <a:r>
-              <a:t>testen op toegankelijkheid van de applicatie,</a:t>
-            </a:r>
-          </a:p>
-          <a:p>
-            <a:pPr>
-              <a:defRPr sz="2000"/>
-            </a:pPr>
-            <a:r>
-              <a:t>produceren van een "software bill of materials" (SBoM) en</a:t>
-            </a:r>
-          </a:p>
-          <a:p>
-            <a:pPr>
-              <a:defRPr sz="2000"/>
-            </a:pPr>
-            <a:r>
-              <a:t>opslaan van artifacten.</a:t>
+              <a:t>De projectleider organiseert een periodiek projectoverleg. Dit overleg vindt wekelijks plaats en duurt niet langer dan een uur. Vereiste aanwezigen zijn de projectleider, de software delivery manager, de Scrummaster, een vertegenwoordiger uit elk van de Scrumteams en de kwaliteitsmanager van het project; andere aanwezigen kunnen zijn: de projectarchitect en de product owner. De agenda voor dit overleg bestaat ten minste uit de volgende onderwerpen: mededelingen, actie- en besluitenlijst, personele zaken, planning en voortgang, kwaliteit en architectuur, risico's en aandachtspunten.</a:t>
             </a:r>
           </a:p>
         </p:txBody>
@@ -22333,7 +22214,7 @@
               <a:defRPr sz="2400"/>
             </a:pPr>
             <a:r>
-              <a:t>M28: Het project voert periodiek een self-assessment uit tegen de actuele versie van de Kwaliteitsaanpak</a:t>
+              <a:t>M16: Het project gebruikt tools voor vastgestelde taken</a:t>
             </a:r>
           </a:p>
         </p:txBody>
@@ -22361,7 +22242,127 @@
           <a:lstStyle/>
           <a:p>
             <a:r>
-              <a:t>De projectleider organiseert periodiek een self-assessment tegen de actuele versie van de Kwaliteitsaanpak en zet verbeteracties uit, waar nodig.</a:t>
+              <a:t>ICTU stelt het gebruik van tools verplicht voor:</a:t>
+            </a:r>
+          </a:p>
+          <a:p>
+            <a:pPr>
+              <a:defRPr sz="2000"/>
+            </a:pPr>
+            <a:r>
+              <a:t>backlog management en agile werken,</a:t>
+            </a:r>
+          </a:p>
+          <a:p>
+            <a:pPr>
+              <a:defRPr sz="2000"/>
+            </a:pPr>
+            <a:r>
+              <a:t>inrichten en uitvoeren van een continuous delivery pipeline,</a:t>
+            </a:r>
+          </a:p>
+          <a:p>
+            <a:pPr>
+              <a:defRPr sz="2000"/>
+            </a:pPr>
+            <a:r>
+              <a:t>monitoren van de kwaliteit van broncode,</a:t>
+            </a:r>
+          </a:p>
+          <a:p>
+            <a:pPr>
+              <a:defRPr sz="2000"/>
+            </a:pPr>
+            <a:r>
+              <a:t>versiebeheer van op te leveren producten,</a:t>
+            </a:r>
+          </a:p>
+          <a:p>
+            <a:pPr>
+              <a:defRPr sz="2000"/>
+            </a:pPr>
+            <a:r>
+              <a:t>release van software,</a:t>
+            </a:r>
+          </a:p>
+          <a:p>
+            <a:pPr>
+              <a:defRPr sz="2000"/>
+            </a:pPr>
+            <a:r>
+              <a:t>maken van testrapportages,</a:t>
+            </a:r>
+          </a:p>
+          <a:p>
+            <a:pPr>
+              <a:defRPr sz="2000"/>
+            </a:pPr>
+            <a:r>
+              <a:t>maken van kwaliteitsrapportages,</a:t>
+            </a:r>
+          </a:p>
+          <a:p>
+            <a:pPr>
+              <a:defRPr sz="2000"/>
+            </a:pPr>
+            <a:r>
+              <a:t>controleren van de configuratie op aanwezigheid van bekende kwetsbaarheden,</a:t>
+            </a:r>
+          </a:p>
+          <a:p>
+            <a:pPr>
+              <a:defRPr sz="2000"/>
+            </a:pPr>
+            <a:r>
+              <a:t>controleren van door de applicatie gebruikte versies van externe software op aanwezigheid van bekende kwetsbaarheden,</a:t>
+            </a:r>
+          </a:p>
+          <a:p>
+            <a:pPr>
+              <a:defRPr sz="2000"/>
+            </a:pPr>
+            <a:r>
+              <a:t>controleren van de software op aanwezigheid van kwetsbare constructies,</a:t>
+            </a:r>
+          </a:p>
+          <a:p>
+            <a:pPr>
+              <a:defRPr sz="2000"/>
+            </a:pPr>
+            <a:r>
+              <a:t>controleren van container images op aanwezigheid van bekende kwetsbaarheden,</a:t>
+            </a:r>
+          </a:p>
+          <a:p>
+            <a:pPr>
+              <a:defRPr sz="2000"/>
+            </a:pPr>
+            <a:r>
+              <a:t>testen van performance en schaalbaarheid,</a:t>
+            </a:r>
+          </a:p>
+          <a:p>
+            <a:pPr>
+              <a:defRPr sz="2000"/>
+            </a:pPr>
+            <a:r>
+              <a:t>testen op toegankelijkheid van de applicatie,</a:t>
+            </a:r>
+          </a:p>
+          <a:p>
+            <a:pPr>
+              <a:defRPr sz="2000"/>
+            </a:pPr>
+            <a:r>
+              <a:t>produceren van een "software bill of materials" (SBoM) en</a:t>
+            </a:r>
+          </a:p>
+          <a:p>
+            <a:pPr>
+              <a:defRPr sz="2000"/>
+            </a:pPr>
+            <a:r>
+              <a:t>opslaan van artifacten.</a:t>
             </a:r>
           </a:p>
         </p:txBody>
@@ -22403,7 +22404,7 @@
               <a:defRPr sz="2400"/>
             </a:pPr>
             <a:r>
-              <a:t>M30: Het project identificeert, mitigeert en bewaakt risico's</a:t>
+              <a:t>M28: Het project voert periodiek een self-assessment uit tegen de actuele versie van de Kwaliteitsaanpak</a:t>
             </a:r>
           </a:p>
         </p:txBody>
@@ -22431,7 +22432,7 @@
           <a:lstStyle/>
           <a:p>
             <a:r>
-              <a:t>Het project identificeert, mitigeert en bewaakt projectspecifieke risico's voorafgaand aan en tijdens de projectuitvoering. Het project houdt een risicolog bij met geïdentificeerde risico's. De uitkomsten van de "Doordacht-van-Start-sessie", die al voorafgaand aan de start van het project wordt uitgevoerd, vormen het startpunt van deze risicolog. Risico's die tijdens de voorfase worden geïdentificeerd, bijvoorbeeld bij de productrisicoanalyse, worden toegevoegd aan de risicolog. Ook bij de start van de realisatiefase worden risicosessies gehouden met (vertegenwoordigers van) de belanghebbenden om verdere risico's te identificeren. Het project identificeert en implementeert mitigerende maatregelen danwel accepteert expliciet de geïdentificeerde risico's. Het project bewaakt de risicolog en uitvoering van de mitigerende maatregelen tijdens het IPO.</a:t>
+              <a:t>De projectleider organiseert periodiek een self-assessment tegen de actuele versie van de Kwaliteitsaanpak en zet verbeteracties uit, waar nodig.</a:t>
             </a:r>
           </a:p>
         </p:txBody>
@@ -22473,7 +22474,7 @@
               <a:defRPr sz="2400"/>
             </a:pPr>
             <a:r>
-              <a:t>M34: Het project draagt software beheerst over</a:t>
+              <a:t>M30: Het project identificeert, mitigeert en bewaakt risico's</a:t>
             </a:r>
           </a:p>
         </p:txBody>
@@ -22501,7 +22502,7 @@
           <a:lstStyle/>
           <a:p>
             <a:r>
-              <a:t>Als de software op enig moment door een andere partij dan ICTU verder ontwikkeld en/of onderhouden zal worden, draagt het project zorg voor een beheerste overdracht. Beheerdocumentatie, broncode en testmiddelen zijn van dusdanige kwaliteit en compleetheid dat de andere partij de software efficiënt en effectief kan doorontwikkelen en/of onderhouden.</a:t>
+              <a:t>Het project identificeert, mitigeert en bewaakt projectspecifieke risico's voorafgaand aan en tijdens de projectuitvoering. Het project houdt een risicolog bij met geïdentificeerde risico's. De uitkomsten van de "Doordacht-van-Start-sessie", die al voorafgaand aan de start van het project wordt uitgevoerd, vormen het startpunt van deze risicolog. Risico's die tijdens de voorfase worden geïdentificeerd, bijvoorbeeld bij de productrisicoanalyse, worden toegevoegd aan de risicolog. Ook bij de start van de realisatiefase worden risicosessies gehouden met (vertegenwoordigers van) de belanghebbenden om verdere risico's te identificeren. Het project identificeert en implementeert mitigerende maatregelen danwel accepteert expliciet de geïdentificeerde risico's. Het project bewaakt de risicolog en uitvoering van de mitigerende maatregelen tijdens het IPO.</a:t>
             </a:r>
           </a:p>
         </p:txBody>
@@ -22543,7 +22544,7 @@
               <a:defRPr sz="2400"/>
             </a:pPr>
             <a:r>
-              <a:t>M27: Het project sluit projectfasen en zichzelf expliciet af</a:t>
+              <a:t>M34: Het project draagt software beheerst over</a:t>
             </a:r>
           </a:p>
         </p:txBody>
@@ -22571,7 +22572,7 @@
           <a:lstStyle/>
           <a:p>
             <a:r>
-              <a:t>Afsluiting van een projectfase gebeurt expliciet en gecontroleerd: alle producten, zoals documentatie, broncode, referentiedata en credentials, die in de af te sluiten fase nodig waren of zijn opgeleverd, worden gearchiveerd. Indien er geen volgende fase is voorzien op korte termijn, dienen alle producten van de laptops van de projectmedewerkers verwijderd te worden.</a:t>
+              <a:t>Als de software op enig moment door een andere partij dan ICTU verder ontwikkeld en/of onderhouden zal worden, draagt het project zorg voor een beheerste overdracht. Beheerdocumentatie, broncode en testmiddelen zijn van dusdanige kwaliteit en compleetheid dat de andere partij de software efficiënt en effectief kan doorontwikkelen en/of onderhouden.</a:t>
             </a:r>
           </a:p>
         </p:txBody>
@@ -22609,27 +22610,41 @@
           <a:bodyPr/>
           <a:lstStyle/>
           <a:p>
+            <a:pPr>
+              <a:defRPr sz="2400"/>
+            </a:pPr>
             <a:r>
-              <a:t>Organisatie</a:t>
+              <a:t>M27: Het project sluit projectfasen en zichzelf expliciet af</a:t>
             </a:r>
           </a:p>
         </p:txBody>
       </p:sp>
       <p:sp>
         <p:nvSpPr>
-          <p:cNvPr id="3" name="Text Placeholder 2"/>
-          <p:cNvSpPr>
-            <a:spLocks noGrp="1"/>
-          </p:cNvSpPr>
-          <p:nvPr>
-            <p:ph type="body" idx="10" sz="quarter"/>
-          </p:nvPr>
-        </p:nvSpPr>
-        <p:spPr/>
-        <p:txBody>
-          <a:bodyPr/>
+          <p:cNvPr id="3" name="TextBox 2"/>
+          <p:cNvSpPr txBox="1"/>
+          <p:nvPr/>
+        </p:nvSpPr>
+        <p:spPr>
+          <a:xfrm>
+            <a:off x="640080" y="1463040"/>
+            <a:ext cx="10972800" cy="5486400"/>
+          </a:xfrm>
+          <a:prstGeom prst="rect">
+            <a:avLst/>
+          </a:prstGeom>
+          <a:noFill/>
+        </p:spPr>
+        <p:txBody>
+          <a:bodyPr wrap="square">
+            <a:spAutoFit/>
+          </a:bodyPr>
           <a:lstStyle/>
-          <a:p/>
+          <a:p>
+            <a:r>
+              <a:t>Afsluiting van een projectfase gebeurt expliciet en gecontroleerd: alle producten, zoals documentatie, broncode, referentiedata en credentials, die in de af te sluiten fase nodig waren of zijn opgeleverd, worden gearchiveerd. Indien er geen volgende fase is voorzien op korte termijn, dienen alle producten van de laptops van de projectmedewerkers verwijderd te worden.</a:t>
+            </a:r>
+          </a:p>
         </p:txBody>
       </p:sp>
     </p:spTree>
@@ -22665,41 +22680,27 @@
           <a:bodyPr/>
           <a:lstStyle/>
           <a:p>
-            <a:pPr>
-              <a:defRPr sz="2400"/>
-            </a:pPr>
             <a:r>
-              <a:t>M29: ICTU organiseert voor aanvang van een project de interne dienstverlening</a:t>
+              <a:t>Organisatie</a:t>
             </a:r>
           </a:p>
         </p:txBody>
       </p:sp>
       <p:sp>
         <p:nvSpPr>
-          <p:cNvPr id="3" name="TextBox 2"/>
-          <p:cNvSpPr txBox="1"/>
-          <p:nvPr/>
-        </p:nvSpPr>
-        <p:spPr>
-          <a:xfrm>
-            <a:off x="640080" y="1463040"/>
-            <a:ext cx="10972800" cy="5486400"/>
-          </a:xfrm>
-          <a:prstGeom prst="rect">
-            <a:avLst/>
-          </a:prstGeom>
-          <a:noFill/>
-        </p:spPr>
-        <p:txBody>
-          <a:bodyPr wrap="square">
-            <a:spAutoFit/>
-          </a:bodyPr>
+          <p:cNvPr id="3" name="Text Placeholder 2"/>
+          <p:cNvSpPr>
+            <a:spLocks noGrp="1"/>
+          </p:cNvSpPr>
+          <p:nvPr>
+            <p:ph type="body" idx="10" sz="quarter"/>
+          </p:nvPr>
+        </p:nvSpPr>
+        <p:spPr/>
+        <p:txBody>
+          <a:bodyPr/>
           <a:lstStyle/>
-          <a:p>
-            <a:r>
-              <a:t>Voordat ICTU een softwareontwikkelproject start, dat gaat werken conform de Kwaliteitsaanpak, maakt de beoogde projectleider afspraken met de afdelingen ICTU Software Diensten (ISD) en ICTU Software Expertise (ISE) over de af te nemen dienstverlening.</a:t>
-            </a:r>
-          </a:p>
+          <a:p/>
         </p:txBody>
       </p:sp>
     </p:spTree>
@@ -22739,7 +22740,7 @@
               <a:defRPr sz="2400"/>
             </a:pPr>
             <a:r>
-              <a:t>M19: ICTU biedt projecten een afgeschermde digitale omgeving</a:t>
+              <a:t>M29: ICTU organiseert voor aanvang van een project de interne dienstverlening</a:t>
             </a:r>
           </a:p>
         </p:txBody>
@@ -22767,7 +22768,7 @@
           <a:lstStyle/>
           <a:p>
             <a:r>
-              <a:t>ICTU geeft de projecten de beschikking over eigen, afgeschermde digitale omgevingen, waarbinnen ze de door het project ontwikkelde software en tools kunnen installeren en waartoe op een beheerste manier toegang wordt verleend.</a:t>
+              <a:t>Voordat ICTU een softwareontwikkelproject start, dat gaat werken conform de Kwaliteitsaanpak, maakt de beoogde projectleider afspraken met de afdelingen ICTU Software Diensten (ISD) en ICTU Software Expertise (ISE) over de af te nemen dienstverlening.</a:t>
             </a:r>
           </a:p>
         </p:txBody>
@@ -22809,7 +22810,7 @@
               <a:defRPr sz="2400"/>
             </a:pPr>
             <a:r>
-              <a:t>M18: ICTU biedt ondersteuning voor verplicht gestelde tools</a:t>
+              <a:t>M19: ICTU biedt projecten een afgeschermde digitale omgeving</a:t>
             </a:r>
           </a:p>
         </p:txBody>
@@ -22837,7 +22838,7 @@
           <a:lstStyle/>
           <a:p>
             <a:r>
-              <a:t>ICTU zorgt voor technische en functionele ondersteuning aan projecten bij het gebruik van alle verplichte tools.</a:t>
+              <a:t>ICTU geeft de projecten de beschikking over eigen, afgeschermde digitale omgevingen, waarbinnen ze de door het project ontwikkelde software en tools kunnen installeren en waartoe op een beheerste manier toegang wordt verleend.</a:t>
             </a:r>
           </a:p>
         </p:txBody>
@@ -22952,7 +22953,7 @@
               <a:defRPr sz="2400"/>
             </a:pPr>
             <a:r>
-              <a:t>M11: ICTU beheert, onderhoudt en implementeert de Kwaliteitsaanpak en kwaliteitsnormen</a:t>
+              <a:t>M18: ICTU biedt ondersteuning voor verplicht gestelde tools</a:t>
             </a:r>
           </a:p>
         </p:txBody>
@@ -22980,7 +22981,7 @@
           <a:lstStyle/>
           <a:p>
             <a:r>
-              <a:t>ICTU beheert, onderhoudt en implementeert de Kwaliteitsaanpak en de kwaliteitsnormen. Aanpassingen zijn gebaseerd op praktijkervaring, nieuwe inzichten en nieuwe mogelijkheden voor meting en analyse. Iedere medewerker kan wijzigingsvoorstellen indienen bij ICTU. ICTU behandelt de wijzigingsvoorstellen, kiest de te nemen actie bij elk wijzigingsvoorstel en legt de wijzigingsvoorstellen en besluiten vast.</a:t>
+              <a:t>ICTU zorgt voor technische en functionele ondersteuning aan projecten bij het gebruik van alle verplichte tools.</a:t>
             </a:r>
           </a:p>
         </p:txBody>
@@ -23022,7 +23023,7 @@
               <a:defRPr sz="2400"/>
             </a:pPr>
             <a:r>
-              <a:t>M12: ICTU publiceert nieuwe versies van de Kwaliteitsaanpak en normen periodiek en op een vaste locatie</a:t>
+              <a:t>M11: ICTU beheert, onderhoudt en implementeert de Kwaliteitsaanpak en kwaliteitsnormen</a:t>
             </a:r>
           </a:p>
         </p:txBody>
@@ -23050,7 +23051,7 @@
           <a:lstStyle/>
           <a:p>
             <a:r>
-              <a:t>ICTU publiceert periodiek een nieuwe versie van de Kwaliteitsaanpak en/of de kwaliteitsnormen op een vaste, bekende locatie.</a:t>
+              <a:t>ICTU beheert, onderhoudt en implementeert de Kwaliteitsaanpak en de kwaliteitsnormen. Aanpassingen zijn gebaseerd op praktijkervaring, nieuwe inzichten en nieuwe mogelijkheden voor meting en analyse. Iedere medewerker kan wijzigingsvoorstellen indienen bij ICTU. ICTU behandelt de wijzigingsvoorstellen, kiest de te nemen actie bij elk wijzigingsvoorstel en legt de wijzigingsvoorstellen en besluiten vast.</a:t>
             </a:r>
           </a:p>
         </p:txBody>
@@ -23064,6 +23065,76 @@
 </file>
 
 <file path=ppt/slides/slide32.xml><?xml version="1.0" encoding="utf-8"?>
+<p:sld xmlns:a="http://schemas.openxmlformats.org/drawingml/2006/main" xmlns:p="http://schemas.openxmlformats.org/presentationml/2006/main" xmlns:r="http://schemas.openxmlformats.org/officeDocument/2006/relationships">
+  <p:cSld>
+    <p:spTree>
+      <p:nvGrpSpPr>
+        <p:cNvPr id="1" name=""/>
+        <p:cNvGrpSpPr/>
+        <p:nvPr/>
+      </p:nvGrpSpPr>
+      <p:grpSpPr/>
+      <p:sp>
+        <p:nvSpPr>
+          <p:cNvPr id="2" name="Title 1"/>
+          <p:cNvSpPr>
+            <a:spLocks noGrp="1"/>
+          </p:cNvSpPr>
+          <p:nvPr>
+            <p:ph type="title"/>
+          </p:nvPr>
+        </p:nvSpPr>
+        <p:spPr/>
+        <p:txBody>
+          <a:bodyPr/>
+          <a:lstStyle/>
+          <a:p>
+            <a:pPr>
+              <a:defRPr sz="2400"/>
+            </a:pPr>
+            <a:r>
+              <a:t>M12: ICTU publiceert nieuwe versies van de Kwaliteitsaanpak en normen periodiek en op een vaste locatie</a:t>
+            </a:r>
+          </a:p>
+        </p:txBody>
+      </p:sp>
+      <p:sp>
+        <p:nvSpPr>
+          <p:cNvPr id="3" name="TextBox 2"/>
+          <p:cNvSpPr txBox="1"/>
+          <p:nvPr/>
+        </p:nvSpPr>
+        <p:spPr>
+          <a:xfrm>
+            <a:off x="640080" y="1463040"/>
+            <a:ext cx="10972800" cy="5486400"/>
+          </a:xfrm>
+          <a:prstGeom prst="rect">
+            <a:avLst/>
+          </a:prstGeom>
+          <a:noFill/>
+        </p:spPr>
+        <p:txBody>
+          <a:bodyPr wrap="square">
+            <a:spAutoFit/>
+          </a:bodyPr>
+          <a:lstStyle/>
+          <a:p>
+            <a:r>
+              <a:t>ICTU publiceert periodiek een nieuwe versie van de Kwaliteitsaanpak en/of de kwaliteitsnormen op een vaste, bekende locatie.</a:t>
+            </a:r>
+          </a:p>
+        </p:txBody>
+      </p:sp>
+    </p:spTree>
+  </p:cSld>
+  <p:clrMapOvr>
+    <a:masterClrMapping/>
+  </p:clrMapOvr>
+</p:sld>
+</file>
+
+<file path=ppt/slides/slide33.xml><?xml version="1.0" encoding="utf-8"?>
 <p:sld xmlns:a="http://schemas.openxmlformats.org/drawingml/2006/main" xmlns:p="http://schemas.openxmlformats.org/presentationml/2006/main" xmlns:r="http://schemas.openxmlformats.org/officeDocument/2006/relationships">
   <p:cSld>
     <p:spTree>

</xml_diff>

<commit_message>
De scope van maatregel M29 "ICTU zorgt dat een project verantwoord kan starten" gereduceerd tot het organiseren van de interne dienstverlening voor aanvang van een project en de titel hieraan aangepast: "ICTU organiseert voor aanvang van een project de interne dienstverlening". Closes #734.
</commit_message>
<xml_diff>
--- a/docs/wip/ICTU-Kwaliteitsaanpak.pptx
+++ b/docs/wip/ICTU-Kwaliteitsaanpak.pptx
@@ -21265,7 +21265,7 @@
               <a:buNone/>
             </a:pPr>
             <a:r>
-              <a:t>Versie 3.1.0-dev, 04-04-2023</a:t>
+              <a:t>Versie 3.1.0-dev, 06-06-2023</a:t>
             </a:r>
           </a:p>
         </p:txBody>
@@ -22740,7 +22740,7 @@
               <a:defRPr sz="2400"/>
             </a:pPr>
             <a:r>
-              <a:t>M29: ICTU zorgt dat een project verantwoord kan starten</a:t>
+              <a:t>M29: ICTU organiseert voor aanvang van een project de interne dienstverlening</a:t>
             </a:r>
           </a:p>
         </p:txBody>
@@ -22768,7 +22768,7 @@
           <a:lstStyle/>
           <a:p>
             <a:r>
-              <a:t>Voordat een softwareontwikkelproject, dat conform de Kwaliteitsaanpak gaat werken, start, toetst ICTU of het project gebaseerd is op een adequaat projectvoorstel en of zij beschikt over de benodigde kennis, diensten en hulpmiddelen om het project te ondersteunen. Zo niet, dan voert de organisatie ofwel het project niet uit, ofwel past zij het projectvoorstel aan en/of organiseert zij de benodigde kennis, diensten en hulpmiddelen.</a:t>
+              <a:t>Voordat ICTU een softwareontwikkelproject start, dat gaat werken conform de Kwaliteitsaanpak, maakt de beoogde projectleider afspraken met de afdelingen ICTU Software Diensten (ISD) en ICTU Software Expertise (ISE) over de af te nemen dienstverlening.</a:t>
             </a:r>
           </a:p>
         </p:txBody>

</xml_diff>

<commit_message>
Voeg template voor voortgang voorfase producten toe.
Closes #760.
</commit_message>
<xml_diff>
--- a/docs/wip/ICTU-Kwaliteitsaanpak.pptx
+++ b/docs/wip/ICTU-Kwaliteitsaanpak.pptx
@@ -21265,7 +21265,7 @@
               <a:buNone/>
             </a:pPr>
             <a:r>
-              <a:t>Versie wip, 06-12-2024</a:t>
+              <a:t>Versie wip, 16-12-2024</a:t>
             </a:r>
           </a:p>
         </p:txBody>
@@ -23341,7 +23341,7 @@
           <a:lstStyle/>
           <a:p>
             <a:r>
-              <a:t>Voor een goede uitvoering van het project is specifieke informatie nodig. De opdrachtgevende organisatie zorgt dat het project bij de start van de voorfase inzicht heeft in de informatie die typisch wordt vastgelegd in een projectstartarchitectuur, business impact analysis en privacy impact assessment. Waar nodig werkt de opdrachtgevende organisatie de informatie bij tijdens de voorfase en realisatiefase.</a:t>
+              <a:t>Voor een goede uitvoering van het project is specifieke informatie nodig. De opdrachtgevende organisatie zorgt dat het project bij de start van de voorfase inzicht heeft in de informatie die typisch wordt vastgelegd in een projectstartarchitectuur, business impact analyse en privacy impact assessment. Waar nodig werkt de opdrachtgevende organisatie de informatie bij tijdens de voorfase en realisatiefase.</a:t>
             </a:r>
           </a:p>
         </p:txBody>

</xml_diff>

<commit_message>
Voeg template voor voortgang voorfase producten toe. (#986)
Closes #760.
</commit_message>
<xml_diff>
--- a/docs/wip/ICTU-Kwaliteitsaanpak.pptx
+++ b/docs/wip/ICTU-Kwaliteitsaanpak.pptx
@@ -21602,14 +21602,6 @@
             </a:pPr>
             <a:r>
               <a:t>maken van kwaliteitsrapportages,</a:t>
-            </a:r>
-          </a:p>
-          <a:p>
-            <a:pPr>
-              <a:defRPr sz="2000"/>
-            </a:pPr>
-            <a:r>
-              <a:t>controleren van de configuratie op aanwezigheid van bekende kwetsbaarheden,</a:t>
             </a:r>
           </a:p>
           <a:p>

</xml_diff>

<commit_message>
Update ISO 25010. (#983)
Update ISO 25010.

- Referenties naar NEN-ISO/IEC 25010:2011 vervangen door NEN-ISO/IEC 25010:2023.
- NEN-ISO/IEC 25010:2023 verwerkt in NFE-template.

Closes #874.
</commit_message>
<xml_diff>
--- a/docs/wip/ICTU-Kwaliteitsaanpak.pptx
+++ b/docs/wip/ICTU-Kwaliteitsaanpak.pptx
@@ -21265,7 +21265,7 @@
               <a:buNone/>
             </a:pPr>
             <a:r>
-              <a:t>Versie wip, 20-12-2024</a:t>
+              <a:t>Versie wip, 28-02-2025</a:t>
             </a:r>
           </a:p>
         </p:txBody>
@@ -21335,7 +21335,7 @@
           <a:lstStyle/>
           <a:p>
             <a:r>
-              <a:t>Voor specificatie en documentatie van vereiste en gewenste kwaliteitseigenschappen, de niet-functionele eisen, maken projecten gebruik van de terminologie en categorisering uit NEN-ISO/IEC 25010. Projecten gebruiken NEN-ISO/IEC 25010 om te controleren of alle relevante kwaliteitseigenschappen van het op te leveren eindproduct worden meegenomen in de ontwikkeling en/of onderhoud van het product.</a:t>
+              <a:t>Voor specificatie en documentatie van vereiste en gewenste kwaliteitseigenschappen, de niet-functionele eisen, maken projecten gebruik van de terminologie en categorisering uit NEN-ISO/IEC 25010:2023. Projecten gebruiken NEN-ISO/IEC 25010:2023 om te controleren of alle relevante kwaliteitseigenschappen van het op te leveren eindproduct worden meegenomen in de ontwikkeling en/of onderhoud van het product.</a:t>
             </a:r>
           </a:p>
         </p:txBody>

</xml_diff>

<commit_message>
Voeg kennis van KA toe aan M23.
De titel van maatregel M23 is veranderd van "Het project zorgt voor de aanwezigheid van ervaring met de Kwaliteitsaanpak" naar "Het project zorgt voor de aanwezigheid van kennis van en ervaring met de Kwaliteitsaanpak". Aan de inhoud is toegevoegd dat nieuwe projectleden uitleg over de Kwaliteitsaanpak krijgen.

Closes #794.
</commit_message>
<xml_diff>
--- a/docs/wip/ICTU-Kwaliteitsaanpak.pptx
+++ b/docs/wip/ICTU-Kwaliteitsaanpak.pptx
@@ -22059,7 +22059,7 @@
               <a:defRPr sz="2400"/>
             </a:pPr>
             <a:r>
-              <a:t>M23: Het project zorgt voor de aanwezigheid van ervaring met de Kwaliteitsaanpak</a:t>
+              <a:t>M23: Het project zorgt voor de aanwezigheid van kennis van en ervaring met de Kwaliteitsaanpak</a:t>
             </a:r>
           </a:p>
         </p:txBody>
@@ -22087,7 +22087,7 @@
           <a:lstStyle/>
           <a:p>
             <a:r>
-              <a:t>De software delivery manager zorgt ervoor dat bij nieuwe projecten wordt gestart met ten minste twee projectleden die bekend zijn met de Kwaliteitsaanpak.</a:t>
+              <a:t>De software delivery manager zorgt ervoor dat bij nieuwe projecten wordt gestart met ten minste twee projectleden die bekend zijn met de Kwaliteitsaanpak. Projectleden die nog niet bekend zijn met de Kwaliteitsaanpak krijgen uitleg over de inhoud en achtergrond van de Kwaliteitsaanpak.</a:t>
             </a:r>
           </a:p>
         </p:txBody>

</xml_diff>

<commit_message>
M13 over ISO-25010 is vervallen.
Maatregel M13 "Het project gebruikt ISO-25010 voor de specificatie van productkwaliteitseisen" is vervallen. Het gebruik van ISO-25010 voor de specificatie van productkwaliteitseisen staat al genoemd in M01 "Het project levert in elke fase vastgestelde producten en informatie op".

Closes #950.
</commit_message>
<xml_diff>
--- a/docs/wip/ICTU-Kwaliteitsaanpak.pptx
+++ b/docs/wip/ICTU-Kwaliteitsaanpak.pptx
@@ -40,7 +40,6 @@
     <p:sldId id="284" r:id="rId41"/>
     <p:sldId id="285" r:id="rId42"/>
     <p:sldId id="286" r:id="rId43"/>
-    <p:sldId id="287" r:id="rId44"/>
   </p:sldIdLst>
   <p:sldSz cx="12192000" cy="6858000"/>
   <p:notesSz cx="6858000" cy="9144000"/>
@@ -21306,7 +21305,7 @@
               <a:defRPr sz="2400"/>
             </a:pPr>
             <a:r>
-              <a:t>M04: Het project borgt de correcte werking van het product met geautomatiseerde regressietests</a:t>
+              <a:t>M07: Het project gebruikt een continuous delivery pipeline om het product te bouwen, testen en op te leveren</a:t>
             </a:r>
           </a:p>
         </p:txBody>
@@ -21334,7 +21333,7 @@
           <a:lstStyle/>
           <a:p>
             <a:r>
-              <a:t>Regressietests - tests die verifiëren of eerder ontwikkelde software nog steeds correct werkt na wijzigingen in de software of aansluiting op andere externe koppelvlakken - zijn geautomatiseerd.</a:t>
+              <a:t>Er is een geautomatiseerde continuous delivery pipeline die aantoonbaar correct werkt en de software bouwt, installeert in de testomgevingen, test op functionele en niet-functionele eigenschappen en oplevert, al dan niet inclusief installatie in de productieomgeving.</a:t>
             </a:r>
           </a:p>
         </p:txBody>
@@ -21376,7 +21375,7 @@
               <a:defRPr sz="2400"/>
             </a:pPr>
             <a:r>
-              <a:t>M07: Het project gebruikt een continuous delivery pipeline om het product te bouwen, testen en op te leveren</a:t>
+              <a:t>M16: Het project gebruikt tools voor vastgestelde taken</a:t>
             </a:r>
           </a:p>
         </p:txBody>
@@ -21404,7 +21403,7 @@
           <a:lstStyle/>
           <a:p>
             <a:r>
-              <a:t>Er is een geautomatiseerde continuous delivery pipeline die aantoonbaar correct werkt en de software bouwt, installeert in de testomgevingen, test op functionele en niet-functionele eigenschappen en oplevert, al dan niet inclusief installatie in de productieomgeving.</a:t>
+              <a:t>Voor vastgestelde taken bij het ontwikkelen, onderhouden en operationeel beheren van software, stelt ICTU het gebruik van tools verplicht. ICTU adviseert per taak specifieke tools en ondersteunt projecten bij het gebruik daarvan.</a:t>
             </a:r>
           </a:p>
         </p:txBody>
@@ -21446,7 +21445,7 @@
               <a:defRPr sz="2400"/>
             </a:pPr>
             <a:r>
-              <a:t>M16: Het project gebruikt tools voor vastgestelde taken</a:t>
+              <a:t>M08: Het project maakt technische schuld inzichtelijk en lost deze planmatig op</a:t>
             </a:r>
           </a:p>
         </p:txBody>
@@ -21474,7 +21473,7 @@
           <a:lstStyle/>
           <a:p>
             <a:r>
-              <a:t>Voor vastgestelde taken bij het ontwikkelen, onderhouden en operationeel beheren van software, stelt ICTU het gebruik van tools verplicht. ICTU adviseert per taak specifieke tools en ondersteunt projecten bij het gebruik daarvan.</a:t>
+              <a:t>Technische schuld is inzichtelijk en wordt planmatig aangepakt. De kwaliteitsmanager is verantwoordelijk voor het inzichtelijk maken van de technische schuld. De software delivery manager is verantwoordelijk voor het planmatig aanpakken van de technische schuld en zorgt dat het Scrumteam regelmatig en voldoende tijd heeft om technische schuld te voorkomen en op te lossen. Het Scrumteam is verantwoordelijk voor het zoveel mogelijk voorkomen van technische schuld en voor het identificeren van technische schuld die toch optreedt.</a:t>
             </a:r>
           </a:p>
         </p:txBody>
@@ -21516,7 +21515,7 @@
               <a:defRPr sz="2400"/>
             </a:pPr>
             <a:r>
-              <a:t>M08: Het project maakt technische schuld inzichtelijk en lost deze planmatig op</a:t>
+              <a:t>M26: Het project laat de beveiliging van het ontwikkelde product periodiek beoordelen</a:t>
             </a:r>
           </a:p>
         </p:txBody>
@@ -21544,7 +21543,7 @@
           <a:lstStyle/>
           <a:p>
             <a:r>
-              <a:t>Technische schuld is inzichtelijk en wordt planmatig aangepakt. De kwaliteitsmanager is verantwoordelijk voor het inzichtelijk maken van de technische schuld. De software delivery manager is verantwoordelijk voor het planmatig aanpakken van de technische schuld en zorgt dat het Scrumteam regelmatig en voldoende tijd heeft om technische schuld te voorkomen en op te lossen. Het Scrumteam is verantwoordelijk voor het zoveel mogelijk voorkomen van technische schuld en voor het identificeren van technische schuld die toch optreedt.</a:t>
+              <a:t>Projecten laten periodiek de beveiliging van de ontwikkelde software beoordelen. Een beveiligingsexpert onderzoekt de code zowel geautomatiseerd als handmatig op veelvoorkomende kwetsbaarheden en op het voldoen aan voorgeschreven beveiligingsnormen. Overheidsspecifieke beveiligingsnormen of -raamwerken, zoals de BIO (Baseline Informatiebeveiliging Overheid), bieden een basis voor de beoordeling. Bevindingen uit de beveiligingstest worden vastgelegd als onderdeel van de werkvoorraad voor het ontwikkelproces.</a:t>
             </a:r>
           </a:p>
         </p:txBody>
@@ -21582,41 +21581,27 @@
           <a:bodyPr/>
           <a:lstStyle/>
           <a:p>
-            <a:pPr>
-              <a:defRPr sz="2400"/>
-            </a:pPr>
             <a:r>
-              <a:t>M26: Het project laat de beveiliging van het ontwikkelde product periodiek beoordelen</a:t>
+              <a:t>Processen</a:t>
             </a:r>
           </a:p>
         </p:txBody>
       </p:sp>
       <p:sp>
         <p:nvSpPr>
-          <p:cNvPr id="3" name="TextBox 2"/>
-          <p:cNvSpPr txBox="1"/>
-          <p:nvPr/>
-        </p:nvSpPr>
-        <p:spPr>
-          <a:xfrm>
-            <a:off x="640080" y="1463040"/>
-            <a:ext cx="10972800" cy="5486400"/>
-          </a:xfrm>
-          <a:prstGeom prst="rect">
-            <a:avLst/>
-          </a:prstGeom>
-          <a:noFill/>
-        </p:spPr>
-        <p:txBody>
-          <a:bodyPr wrap="square">
-            <a:spAutoFit/>
-          </a:bodyPr>
+          <p:cNvPr id="3" name="Text Placeholder 2"/>
+          <p:cNvSpPr>
+            <a:spLocks noGrp="1"/>
+          </p:cNvSpPr>
+          <p:nvPr>
+            <p:ph type="body" idx="10" sz="quarter"/>
+          </p:nvPr>
+        </p:nvSpPr>
+        <p:spPr/>
+        <p:txBody>
+          <a:bodyPr/>
           <a:lstStyle/>
-          <a:p>
-            <a:r>
-              <a:t>Projecten laten periodiek de beveiliging van de ontwikkelde software beoordelen. Een beveiligingsexpert onderzoekt de code zowel geautomatiseerd als handmatig op veelvoorkomende kwetsbaarheden en op het voldoen aan voorgeschreven beveiligingsnormen. Overheidsspecifieke beveiligingsnormen of -raamwerken, zoals de BIO (Baseline Informatiebeveiliging Overheid), bieden een basis voor de beoordeling. Bevindingen uit de beveiligingstest worden vastgelegd als onderdeel van de werkvoorraad voor het ontwikkelproces.</a:t>
-            </a:r>
-          </a:p>
+          <a:p/>
         </p:txBody>
       </p:sp>
     </p:spTree>
@@ -21652,27 +21637,41 @@
           <a:bodyPr/>
           <a:lstStyle/>
           <a:p>
+            <a:pPr>
+              <a:defRPr sz="2400"/>
+            </a:pPr>
             <a:r>
-              <a:t>Processen</a:t>
+              <a:t>M14: Het project bereidt samen met opdrachtgevende organisatie en betrokken partijen de realisatie voor</a:t>
             </a:r>
           </a:p>
         </p:txBody>
       </p:sp>
       <p:sp>
         <p:nvSpPr>
-          <p:cNvPr id="3" name="Text Placeholder 2"/>
-          <p:cNvSpPr>
-            <a:spLocks noGrp="1"/>
-          </p:cNvSpPr>
-          <p:nvPr>
-            <p:ph type="body" idx="10" sz="quarter"/>
-          </p:nvPr>
-        </p:nvSpPr>
-        <p:spPr/>
-        <p:txBody>
-          <a:bodyPr/>
+          <p:cNvPr id="3" name="TextBox 2"/>
+          <p:cNvSpPr txBox="1"/>
+          <p:nvPr/>
+        </p:nvSpPr>
+        <p:spPr>
+          <a:xfrm>
+            <a:off x="640080" y="1463040"/>
+            <a:ext cx="10972800" cy="5486400"/>
+          </a:xfrm>
+          <a:prstGeom prst="rect">
+            <a:avLst/>
+          </a:prstGeom>
+          <a:noFill/>
+        </p:spPr>
+        <p:txBody>
+          <a:bodyPr wrap="square">
+            <a:spAutoFit/>
+          </a:bodyPr>
           <a:lstStyle/>
-          <a:p/>
+          <a:p>
+            <a:r>
+              <a:t>Projecten hebben een voorbereidingsfase, "voorfase" genoemd, voorafgaand aan de realisatiefase. Voor het uitvoeren van de voorfase zijn vertegenwoordigers van de opdrachtgevende organisatie, de beoogde beheerorganisatie en andere partijen betrokken die meewerken aan het realiseren van een deel van de op te leveren producten. Het doel van de voorfase is beeld krijgen van de te realiseren oplossing, van de risico's die zich tijdens realisatie kunnen voordoen en van de kaders waarbinnen de oplossing moet passen; tijdens de realisatiefase vinden bouw en onderhoud van de software en actualiseren en afronden van documentatie plaats.</a:t>
+            </a:r>
+          </a:p>
         </p:txBody>
       </p:sp>
     </p:spTree>
@@ -21712,7 +21711,7 @@
               <a:defRPr sz="2400"/>
             </a:pPr>
             <a:r>
-              <a:t>M14: Het project bereidt samen met opdrachtgevende organisatie en betrokken partijen de realisatie voor</a:t>
+              <a:t>M21: Het project selecteert medewerkers op basis van kwaliteit</a:t>
             </a:r>
           </a:p>
         </p:txBody>
@@ -21740,7 +21739,7 @@
           <a:lstStyle/>
           <a:p>
             <a:r>
-              <a:t>Projecten hebben een voorbereidingsfase, "voorfase" genoemd, voorafgaand aan de realisatiefase. Voor het uitvoeren van de voorfase zijn vertegenwoordigers van de opdrachtgevende organisatie, de beoogde beheerorganisatie en andere partijen betrokken die meewerken aan het realiseren van een deel van de op te leveren producten. Het doel van de voorfase is beeld krijgen van de te realiseren oplossing, van de risico's die zich tijdens realisatie kunnen voordoen en van de kaders waarbinnen de oplossing moet passen; tijdens de realisatiefase vinden bouw en onderhoud van de software en actualiseren en afronden van documentatie plaats.</a:t>
+              <a:t>Bij de inzet van medewerkers gaat kwaliteit boven andere aspecten, zoals beschikbaarheid, prijs en doorlooptijd.</a:t>
             </a:r>
           </a:p>
         </p:txBody>
@@ -21782,7 +21781,7 @@
               <a:defRPr sz="2400"/>
             </a:pPr>
             <a:r>
-              <a:t>M21: Het project selecteert medewerkers op basis van kwaliteit</a:t>
+              <a:t>M23: Het project zorgt voor de aanwezigheid van kennis van en ervaring met de Kwaliteitsaanpak</a:t>
             </a:r>
           </a:p>
         </p:txBody>
@@ -21810,7 +21809,7 @@
           <a:lstStyle/>
           <a:p>
             <a:r>
-              <a:t>Bij de inzet van medewerkers gaat kwaliteit boven andere aspecten, zoals beschikbaarheid, prijs en doorlooptijd.</a:t>
+              <a:t>De software delivery manager zorgt ervoor dat bij nieuwe projecten wordt gestart met ten minste twee projectleden die bekend zijn met de Kwaliteitsaanpak. Projectleden die nog niet bekend zijn met de Kwaliteitsaanpak krijgen uitleg over de inhoud en achtergrond van de Kwaliteitsaanpak.</a:t>
             </a:r>
           </a:p>
         </p:txBody>
@@ -21852,7 +21851,7 @@
               <a:defRPr sz="2400"/>
             </a:pPr>
             <a:r>
-              <a:t>M23: Het project zorgt voor de aanwezigheid van kennis van en ervaring met de Kwaliteitsaanpak</a:t>
+              <a:t>M05: Het project hanteert een iteratief en incrementeel ontwikkelproces</a:t>
             </a:r>
           </a:p>
         </p:txBody>
@@ -21880,7 +21879,7 @@
           <a:lstStyle/>
           <a:p>
             <a:r>
-              <a:t>De software delivery manager zorgt ervoor dat bij nieuwe projecten wordt gestart met ten minste twee projectleden die bekend zijn met de Kwaliteitsaanpak. Projectleden die nog niet bekend zijn met de Kwaliteitsaanpak krijgen uitleg over de inhoud en achtergrond van de Kwaliteitsaanpak.</a:t>
+              <a:t>Projecten werken iteratief en incrementeel; dit betekent dat een project in korte iteraties werkt, waarbij elke iteratie een werkende versie van de software oplevert die extra waarde vertegenwoordigt voor de opdrachtgevende organisatie. Behalve de software werkt het project ook iedere iteratie alle andere producten bij. Elke iteratie worden verwachtingen en werkelijke resultaten vergeleken en wordt de werkwijze aangescherpt op basis van inzichten en bevindingen.</a:t>
             </a:r>
           </a:p>
         </p:txBody>
@@ -21922,7 +21921,7 @@
               <a:defRPr sz="2400"/>
             </a:pPr>
             <a:r>
-              <a:t>M05: Het project hanteert een iteratief en incrementeel ontwikkelproces</a:t>
+              <a:t>M35: Het project hanteert een agile architectuuraanpak</a:t>
             </a:r>
           </a:p>
         </p:txBody>
@@ -21950,7 +21949,7 @@
           <a:lstStyle/>
           <a:p>
             <a:r>
-              <a:t>Projecten werken iteratief en incrementeel; dit betekent dat een project in korte iteraties werkt, waarbij elke iteratie een werkende versie van de software oplevert die extra waarde vertegenwoordigt voor de opdrachtgevende organisatie. Behalve de software werkt het project ook iedere iteratie alle andere producten bij. Elke iteratie worden verwachtingen en werkelijke resultaten vergeleken en wordt de werkwijze aangescherpt op basis van inzichten en bevindingen.</a:t>
+              <a:t>Tijdens de voorfase verwerkt het project de door de opdrachtgevende organisatie opgestelde projectstartarchitectuur (PSA) in een eerste versie van het softwarearchitectuurdocument (SAD). Tijdens de realisatiefase werkt het project het SAD bij op basis van nieuwe inzichten.</a:t>
             </a:r>
           </a:p>
         </p:txBody>
@@ -22073,7 +22072,7 @@
               <a:defRPr sz="2400"/>
             </a:pPr>
             <a:r>
-              <a:t>M35: Het project hanteert een agile architectuuraanpak</a:t>
+              <a:t>M10: Het project kent een wekelijks projectoverleg</a:t>
             </a:r>
           </a:p>
         </p:txBody>
@@ -22101,7 +22100,7 @@
           <a:lstStyle/>
           <a:p>
             <a:r>
-              <a:t>Tijdens de voorfase verwerkt het project de door de opdrachtgevende organisatie opgestelde projectstartarchitectuur (PSA) in een eerste versie van het softwarearchitectuurdocument (SAD). Tijdens de realisatiefase werkt het project het SAD bij op basis van nieuwe inzichten.</a:t>
+              <a:t>De projectleider organiseert een periodiek projectoverleg. Dit overleg vindt wekelijks plaats en duurt niet langer dan een uur. Vereiste aanwezigen zijn de projectleider, de software delivery manager, de Scrummaster, een vertegenwoordiger uit elk van de Scrumteams en de kwaliteitsmanager van het project; andere aanwezigen kunnen zijn: de projectarchitect en de product owner. De agenda voor dit overleg bestaat ten minste uit de volgende onderwerpen: mededelingen, actie- en besluitenlijst, personele zaken, planning en voortgang, kwaliteit en architectuur, risico's en aandachtspunten.</a:t>
             </a:r>
           </a:p>
         </p:txBody>
@@ -22143,7 +22142,7 @@
               <a:defRPr sz="2400"/>
             </a:pPr>
             <a:r>
-              <a:t>M10: Het project kent een wekelijks projectoverleg</a:t>
+              <a:t>M28: Het project voert periodiek een self-assessment uit tegen de actuele versie van de Kwaliteitsaanpak</a:t>
             </a:r>
           </a:p>
         </p:txBody>
@@ -22171,7 +22170,7 @@
           <a:lstStyle/>
           <a:p>
             <a:r>
-              <a:t>De projectleider organiseert een periodiek projectoverleg. Dit overleg vindt wekelijks plaats en duurt niet langer dan een uur. Vereiste aanwezigen zijn de projectleider, de software delivery manager, de Scrummaster, een vertegenwoordiger uit elk van de Scrumteams en de kwaliteitsmanager van het project; andere aanwezigen kunnen zijn: de projectarchitect en de product owner. De agenda voor dit overleg bestaat ten minste uit de volgende onderwerpen: mededelingen, actie- en besluitenlijst, personele zaken, planning en voortgang, kwaliteit en architectuur, risico's en aandachtspunten.</a:t>
+              <a:t>De projectleider organiseert periodiek een self-assessment tegen de actuele versie van de Kwaliteitsaanpak en zet verbeteracties uit, waar nodig.</a:t>
             </a:r>
           </a:p>
         </p:txBody>
@@ -22213,7 +22212,7 @@
               <a:defRPr sz="2400"/>
             </a:pPr>
             <a:r>
-              <a:t>M28: Het project voert periodiek een self-assessment uit tegen de actuele versie van de Kwaliteitsaanpak</a:t>
+              <a:t>M30: Het project identificeert, mitigeert en bewaakt risico's</a:t>
             </a:r>
           </a:p>
         </p:txBody>
@@ -22241,7 +22240,7 @@
           <a:lstStyle/>
           <a:p>
             <a:r>
-              <a:t>De projectleider organiseert periodiek een self-assessment tegen de actuele versie van de Kwaliteitsaanpak en zet verbeteracties uit, waar nodig.</a:t>
+              <a:t>Het project identificeert, mitigeert en bewaakt projectspecifieke risico's voorafgaand aan en tijdens de projectuitvoering. Het project houdt een risicolog bij met geïdentificeerde risico's. De uitkomsten van de "Doordacht-van-Start-sessie", die al voorafgaand aan de start van het project wordt uitgevoerd, vormen het startpunt van deze risicolog. Risico's die tijdens de voorfase worden geïdentificeerd, bijvoorbeeld bij de productrisicoanalyse, worden toegevoegd aan de risicolog. Ook bij de start van de realisatiefase worden risicosessies gehouden met (vertegenwoordigers van) de belanghebbenden om verdere risico's te identificeren. Het project identificeert en implementeert mitigerende maatregelen danwel accepteert expliciet de geïdentificeerde risico's. Het project bewaakt de risicolog en uitvoering van de mitigerende maatregelen tijdens het IPO.</a:t>
             </a:r>
           </a:p>
         </p:txBody>
@@ -22283,7 +22282,7 @@
               <a:defRPr sz="2400"/>
             </a:pPr>
             <a:r>
-              <a:t>M30: Het project identificeert, mitigeert en bewaakt risico's</a:t>
+              <a:t>M34: Het project draagt software beheerst over</a:t>
             </a:r>
           </a:p>
         </p:txBody>
@@ -22311,7 +22310,7 @@
           <a:lstStyle/>
           <a:p>
             <a:r>
-              <a:t>Het project identificeert, mitigeert en bewaakt projectspecifieke risico's voorafgaand aan en tijdens de projectuitvoering. Het project houdt een risicolog bij met geïdentificeerde risico's. De uitkomsten van de "Doordacht-van-Start-sessie", die al voorafgaand aan de start van het project wordt uitgevoerd, vormen het startpunt van deze risicolog. Risico's die tijdens de voorfase worden geïdentificeerd, bijvoorbeeld bij de productrisicoanalyse, worden toegevoegd aan de risicolog. Ook bij de start van de realisatiefase worden risicosessies gehouden met (vertegenwoordigers van) de belanghebbenden om verdere risico's te identificeren. Het project identificeert en implementeert mitigerende maatregelen danwel accepteert expliciet de geïdentificeerde risico's. Het project bewaakt de risicolog en uitvoering van de mitigerende maatregelen tijdens het IPO.</a:t>
+              <a:t>Als de software op enig moment door een andere partij dan ICTU verder ontwikkeld en/of onderhouden zal worden, draagt het project zorg voor een beheerste overdracht. Beheerdocumentatie, broncode en testmiddelen zijn van dusdanige kwaliteit en compleetheid dat de andere partij de software efficiënt en effectief kan doorontwikkelen en/of onderhouden.</a:t>
             </a:r>
           </a:p>
         </p:txBody>
@@ -22353,7 +22352,7 @@
               <a:defRPr sz="2400"/>
             </a:pPr>
             <a:r>
-              <a:t>M34: Het project draagt software beheerst over</a:t>
+              <a:t>M27: Het project sluit projectfasen en zichzelf expliciet af</a:t>
             </a:r>
           </a:p>
         </p:txBody>
@@ -22381,7 +22380,7 @@
           <a:lstStyle/>
           <a:p>
             <a:r>
-              <a:t>Als de software op enig moment door een andere partij dan ICTU verder ontwikkeld en/of onderhouden zal worden, draagt het project zorg voor een beheerste overdracht. Beheerdocumentatie, broncode en testmiddelen zijn van dusdanige kwaliteit en compleetheid dat de andere partij de software efficiënt en effectief kan doorontwikkelen en/of onderhouden.</a:t>
+              <a:t>Afsluiting van een projectfase gebeurt expliciet en gecontroleerd: alle producten, zoals documentatie, broncode, referentiedata en credentials, die in de af te sluiten fase nodig waren of zijn opgeleverd, worden gearchiveerd. Indien er geen volgende fase is voorzien op korte termijn, dienen alle producten van de laptops van de projectmedewerkers verwijderd te worden.</a:t>
             </a:r>
           </a:p>
         </p:txBody>
@@ -22419,41 +22418,27 @@
           <a:bodyPr/>
           <a:lstStyle/>
           <a:p>
-            <a:pPr>
-              <a:defRPr sz="2400"/>
-            </a:pPr>
             <a:r>
-              <a:t>M27: Het project sluit projectfasen en zichzelf expliciet af</a:t>
+              <a:t>Organisatie</a:t>
             </a:r>
           </a:p>
         </p:txBody>
       </p:sp>
       <p:sp>
         <p:nvSpPr>
-          <p:cNvPr id="3" name="TextBox 2"/>
-          <p:cNvSpPr txBox="1"/>
-          <p:nvPr/>
-        </p:nvSpPr>
-        <p:spPr>
-          <a:xfrm>
-            <a:off x="640080" y="1463040"/>
-            <a:ext cx="10972800" cy="5486400"/>
-          </a:xfrm>
-          <a:prstGeom prst="rect">
-            <a:avLst/>
-          </a:prstGeom>
-          <a:noFill/>
-        </p:spPr>
-        <p:txBody>
-          <a:bodyPr wrap="square">
-            <a:spAutoFit/>
-          </a:bodyPr>
+          <p:cNvPr id="3" name="Text Placeholder 2"/>
+          <p:cNvSpPr>
+            <a:spLocks noGrp="1"/>
+          </p:cNvSpPr>
+          <p:nvPr>
+            <p:ph type="body" idx="10" sz="quarter"/>
+          </p:nvPr>
+        </p:nvSpPr>
+        <p:spPr/>
+        <p:txBody>
+          <a:bodyPr/>
           <a:lstStyle/>
-          <a:p>
-            <a:r>
-              <a:t>Afsluiting van een projectfase gebeurt expliciet en gecontroleerd: alle producten, zoals documentatie, broncode, referentiedata en credentials, die in de af te sluiten fase nodig waren of zijn opgeleverd, worden gearchiveerd. Indien er geen volgende fase is voorzien op korte termijn, dienen alle producten van de laptops van de projectmedewerkers verwijderd te worden.</a:t>
-            </a:r>
-          </a:p>
+          <a:p/>
         </p:txBody>
       </p:sp>
     </p:spTree>
@@ -22489,27 +22474,41 @@
           <a:bodyPr/>
           <a:lstStyle/>
           <a:p>
+            <a:pPr>
+              <a:defRPr sz="2400"/>
+            </a:pPr>
             <a:r>
-              <a:t>Organisatie</a:t>
+              <a:t>M29: ICTU organiseert voor aanvang van een project de interne dienstverlening</a:t>
             </a:r>
           </a:p>
         </p:txBody>
       </p:sp>
       <p:sp>
         <p:nvSpPr>
-          <p:cNvPr id="3" name="Text Placeholder 2"/>
-          <p:cNvSpPr>
-            <a:spLocks noGrp="1"/>
-          </p:cNvSpPr>
-          <p:nvPr>
-            <p:ph type="body" idx="10" sz="quarter"/>
-          </p:nvPr>
-        </p:nvSpPr>
-        <p:spPr/>
-        <p:txBody>
-          <a:bodyPr/>
+          <p:cNvPr id="3" name="TextBox 2"/>
+          <p:cNvSpPr txBox="1"/>
+          <p:nvPr/>
+        </p:nvSpPr>
+        <p:spPr>
+          <a:xfrm>
+            <a:off x="640080" y="1463040"/>
+            <a:ext cx="10972800" cy="5486400"/>
+          </a:xfrm>
+          <a:prstGeom prst="rect">
+            <a:avLst/>
+          </a:prstGeom>
+          <a:noFill/>
+        </p:spPr>
+        <p:txBody>
+          <a:bodyPr wrap="square">
+            <a:spAutoFit/>
+          </a:bodyPr>
           <a:lstStyle/>
-          <a:p/>
+          <a:p>
+            <a:r>
+              <a:t>Voordat ICTU een softwareontwikkelproject start, dat gaat werken conform de Kwaliteitsaanpak, maakt de beoogde ICTU-projectleider afspraken met de afdelingen ICTU Software Diensten (ISD) en ICTU Software Expertise (ISE) over de af te nemen dienstverlening.</a:t>
+            </a:r>
+          </a:p>
         </p:txBody>
       </p:sp>
     </p:spTree>
@@ -22549,7 +22548,7 @@
               <a:defRPr sz="2400"/>
             </a:pPr>
             <a:r>
-              <a:t>M29: ICTU organiseert voor aanvang van een project de interne dienstverlening</a:t>
+              <a:t>M19: ICTU biedt projecten een afgeschermde digitale omgeving</a:t>
             </a:r>
           </a:p>
         </p:txBody>
@@ -22577,7 +22576,7 @@
           <a:lstStyle/>
           <a:p>
             <a:r>
-              <a:t>Voordat ICTU een softwareontwikkelproject start, dat gaat werken conform de Kwaliteitsaanpak, maakt de beoogde ICTU-projectleider afspraken met de afdelingen ICTU Software Diensten (ISD) en ICTU Software Expertise (ISE) over de af te nemen dienstverlening.</a:t>
+              <a:t>ICTU geeft de projecten de beschikking over eigen, afgeschermde digitale omgevingen, waarbinnen ze de door het project ontwikkelde software en tools kunnen installeren en waartoe op een beheerste manier toegang wordt verleend.</a:t>
             </a:r>
           </a:p>
         </p:txBody>
@@ -22619,7 +22618,7 @@
               <a:defRPr sz="2400"/>
             </a:pPr>
             <a:r>
-              <a:t>M19: ICTU biedt projecten een afgeschermde digitale omgeving</a:t>
+              <a:t>M18: ICTU biedt ondersteuning voor verplicht gestelde tools</a:t>
             </a:r>
           </a:p>
         </p:txBody>
@@ -22647,7 +22646,7 @@
           <a:lstStyle/>
           <a:p>
             <a:r>
-              <a:t>ICTU geeft de projecten de beschikking over eigen, afgeschermde digitale omgevingen, waarbinnen ze de door het project ontwikkelde software en tools kunnen installeren en waartoe op een beheerste manier toegang wordt verleend.</a:t>
+              <a:t>ICTU zorgt voor technische en functionele ondersteuning aan projecten bij het gebruik van alle verplichte tools.</a:t>
             </a:r>
           </a:p>
         </p:txBody>
@@ -22689,7 +22688,7 @@
               <a:defRPr sz="2400"/>
             </a:pPr>
             <a:r>
-              <a:t>M18: ICTU biedt ondersteuning voor verplicht gestelde tools</a:t>
+              <a:t>M11: ICTU beheert, onderhoudt en implementeert de Kwaliteitsaanpak en kwaliteitsnormen</a:t>
             </a:r>
           </a:p>
         </p:txBody>
@@ -22717,7 +22716,7 @@
           <a:lstStyle/>
           <a:p>
             <a:r>
-              <a:t>ICTU zorgt voor technische en functionele ondersteuning aan projecten bij het gebruik van alle verplichte tools.</a:t>
+              <a:t>ICTU beheert, onderhoudt en implementeert de Kwaliteitsaanpak en de kwaliteitsnormen. Aanpassingen zijn gebaseerd op praktijkervaring, nieuwe inzichten en nieuwe mogelijkheden voor meting en analyse. Iedere medewerker kan wijzigingsvoorstellen indienen bij ICTU. ICTU behandelt de wijzigingsvoorstellen, kiest de te nemen actie bij elk wijzigingsvoorstel en legt de wijzigingsvoorstellen en besluiten vast.</a:t>
             </a:r>
           </a:p>
         </p:txBody>
@@ -22832,7 +22831,7 @@
               <a:defRPr sz="2400"/>
             </a:pPr>
             <a:r>
-              <a:t>M11: ICTU beheert, onderhoudt en implementeert de Kwaliteitsaanpak en kwaliteitsnormen</a:t>
+              <a:t>M12: ICTU publiceert nieuwe versies van de Kwaliteitsaanpak en normen periodiek en op een vaste locatie</a:t>
             </a:r>
           </a:p>
         </p:txBody>
@@ -22860,7 +22859,7 @@
           <a:lstStyle/>
           <a:p>
             <a:r>
-              <a:t>ICTU beheert, onderhoudt en implementeert de Kwaliteitsaanpak en de kwaliteitsnormen. Aanpassingen zijn gebaseerd op praktijkervaring, nieuwe inzichten en nieuwe mogelijkheden voor meting en analyse. Iedere medewerker kan wijzigingsvoorstellen indienen bij ICTU. ICTU behandelt de wijzigingsvoorstellen, kiest de te nemen actie bij elk wijzigingsvoorstel en legt de wijzigingsvoorstellen en besluiten vast.</a:t>
+              <a:t>ICTU publiceert periodiek een nieuwe versie van de Kwaliteitsaanpak en/of de kwaliteitsnormen op een vaste, bekende locatie.</a:t>
             </a:r>
           </a:p>
         </p:txBody>
@@ -22902,76 +22901,6 @@
               <a:defRPr sz="2400"/>
             </a:pPr>
             <a:r>
-              <a:t>M12: ICTU publiceert nieuwe versies van de Kwaliteitsaanpak en normen periodiek en op een vaste locatie</a:t>
-            </a:r>
-          </a:p>
-        </p:txBody>
-      </p:sp>
-      <p:sp>
-        <p:nvSpPr>
-          <p:cNvPr id="3" name="TextBox 2"/>
-          <p:cNvSpPr txBox="1"/>
-          <p:nvPr/>
-        </p:nvSpPr>
-        <p:spPr>
-          <a:xfrm>
-            <a:off x="640080" y="1463040"/>
-            <a:ext cx="10972800" cy="5486400"/>
-          </a:xfrm>
-          <a:prstGeom prst="rect">
-            <a:avLst/>
-          </a:prstGeom>
-          <a:noFill/>
-        </p:spPr>
-        <p:txBody>
-          <a:bodyPr wrap="square">
-            <a:spAutoFit/>
-          </a:bodyPr>
-          <a:lstStyle/>
-          <a:p>
-            <a:r>
-              <a:t>ICTU publiceert periodiek een nieuwe versie van de Kwaliteitsaanpak en/of de kwaliteitsnormen op een vaste, bekende locatie.</a:t>
-            </a:r>
-          </a:p>
-        </p:txBody>
-      </p:sp>
-    </p:spTree>
-  </p:cSld>
-  <p:clrMapOvr>
-    <a:masterClrMapping/>
-  </p:clrMapOvr>
-</p:sld>
-</file>
-
-<file path=ppt/slides/slide32.xml><?xml version="1.0" encoding="utf-8"?>
-<p:sld xmlns:a="http://schemas.openxmlformats.org/drawingml/2006/main" xmlns:p="http://schemas.openxmlformats.org/presentationml/2006/main" xmlns:r="http://schemas.openxmlformats.org/officeDocument/2006/relationships">
-  <p:cSld>
-    <p:spTree>
-      <p:nvGrpSpPr>
-        <p:cNvPr id="1" name=""/>
-        <p:cNvGrpSpPr/>
-        <p:nvPr/>
-      </p:nvGrpSpPr>
-      <p:grpSpPr/>
-      <p:sp>
-        <p:nvSpPr>
-          <p:cNvPr id="2" name="Title 1"/>
-          <p:cNvSpPr>
-            <a:spLocks noGrp="1"/>
-          </p:cNvSpPr>
-          <p:nvPr>
-            <p:ph type="title"/>
-          </p:nvPr>
-        </p:nvSpPr>
-        <p:spPr/>
-        <p:txBody>
-          <a:bodyPr/>
-          <a:lstStyle/>
-          <a:p>
-            <a:pPr>
-              <a:defRPr sz="2400"/>
-            </a:pPr>
-            <a:r>
               <a:t>M33: ICTU organiseert periodiek een gezamenlijke self-assessment ten aanzien van de Kwaliteitsaanpak</a:t>
             </a:r>
           </a:p>
@@ -23378,7 +23307,7 @@
               <a:defRPr sz="2400"/>
             </a:pPr>
             <a:r>
-              <a:t>M13: Het project gebruikt ISO-25010 voor de specificatie van productkwaliteitseisen</a:t>
+              <a:t>M04: Het project borgt de correcte werking van het product met geautomatiseerde regressietests</a:t>
             </a:r>
           </a:p>
         </p:txBody>
@@ -23406,7 +23335,7 @@
           <a:lstStyle/>
           <a:p>
             <a:r>
-              <a:t>Voor specificatie en documentatie van vereiste en gewenste kwaliteitseigenschappen, de niet-functionele eisen, maken projecten gebruik van de terminologie en categorisering uit NEN-ISO/IEC 25010:2023. Projecten gebruiken NEN-ISO/IEC 25010:2023 om te controleren of alle relevante kwaliteitseigenschappen van het op te leveren eindproduct worden meegenomen in de ontwikkeling en/of onderhoud van het product.</a:t>
+              <a:t>Regressietests - tests die verifiëren of eerder ontwikkelde software nog steeds correct werkt na wijzigingen in de software of aansluiting op andere externe koppelvlakken - zijn geautomatiseerd.</a:t>
             </a:r>
           </a:p>
         </p:txBody>

</xml_diff>

<commit_message>
In M16 de twee opsommingen gecombineerd in 1 tabel.
In M16 "Het project gebruikt tools voor vastgestelde taken" de opsomming van taken gecombineerd met de opsomming van tools in één tabel.

Closes #937.
</commit_message>
<xml_diff>
--- a/docs/wip/ICTU-Kwaliteitsaanpak.pptx
+++ b/docs/wip/ICTU-Kwaliteitsaanpak.pptx
@@ -21474,143 +21474,7 @@
           <a:lstStyle/>
           <a:p>
             <a:r>
-              <a:t>ICTU stelt het gebruik van tools verplicht voor de volgende taken:</a:t>
-            </a:r>
-          </a:p>
-          <a:p>
-            <a:pPr>
-              <a:defRPr sz="2000"/>
-            </a:pPr>
-            <a:r>
-              <a:t>product en sprint backlog management en agile werken,</a:t>
-            </a:r>
-          </a:p>
-          <a:p>
-            <a:pPr>
-              <a:defRPr sz="2000"/>
-            </a:pPr>
-            <a:r>
-              <a:t>inrichten en uitvoeren van een continuous delivery pipeline,</a:t>
-            </a:r>
-          </a:p>
-          <a:p>
-            <a:pPr>
-              <a:defRPr sz="2000"/>
-            </a:pPr>
-            <a:r>
-              <a:t>monitoren van de kwaliteit van broncode,</a:t>
-            </a:r>
-          </a:p>
-          <a:p>
-            <a:pPr>
-              <a:defRPr sz="2000"/>
-            </a:pPr>
-            <a:r>
-              <a:t>versiebeheer van op te leveren producten,</a:t>
-            </a:r>
-          </a:p>
-          <a:p>
-            <a:pPr>
-              <a:defRPr sz="2000"/>
-            </a:pPr>
-            <a:r>
-              <a:t>release van software,</a:t>
-            </a:r>
-          </a:p>
-          <a:p>
-            <a:pPr>
-              <a:defRPr sz="2000"/>
-            </a:pPr>
-            <a:r>
-              <a:t>maken van testrapportages,</a:t>
-            </a:r>
-          </a:p>
-          <a:p>
-            <a:pPr>
-              <a:defRPr sz="2000"/>
-            </a:pPr>
-            <a:r>
-              <a:t>maken van kwaliteitsrapportages,</a:t>
-            </a:r>
-          </a:p>
-          <a:p>
-            <a:pPr>
-              <a:defRPr sz="2000"/>
-            </a:pPr>
-            <a:r>
-              <a:t>controleren van door de applicatie gebruikte versies van externe software op aanwezigheid van bekende kwetsbaarheden,</a:t>
-            </a:r>
-          </a:p>
-          <a:p>
-            <a:pPr>
-              <a:defRPr sz="2000"/>
-            </a:pPr>
-            <a:r>
-              <a:t>statische controle van de software op aanwezigheid van kwetsbare constructies,</a:t>
-            </a:r>
-          </a:p>
-          <a:p>
-            <a:pPr>
-              <a:defRPr sz="2000"/>
-            </a:pPr>
-            <a:r>
-              <a:t>dynamische controle van de software op aanwezigheid van kwetsbare constructies,</a:t>
-            </a:r>
-          </a:p>
-          <a:p>
-            <a:pPr>
-              <a:defRPr sz="2000"/>
-            </a:pPr>
-            <a:r>
-              <a:t>controleren van container images op aanwezigheid van bekende kwetsbaarheden,</a:t>
-            </a:r>
-          </a:p>
-          <a:p>
-            <a:pPr>
-              <a:defRPr sz="2000"/>
-            </a:pPr>
-            <a:r>
-              <a:t>testen van performance en schaalbaarheid,</a:t>
-            </a:r>
-          </a:p>
-          <a:p>
-            <a:pPr>
-              <a:defRPr sz="2000"/>
-            </a:pPr>
-            <a:r>
-              <a:t>testen op toegankelijkheid van de applicatie,</a:t>
-            </a:r>
-          </a:p>
-          <a:p>
-            <a:pPr>
-              <a:defRPr sz="2000"/>
-            </a:pPr>
-            <a:r>
-              <a:t>produceren van een "software bill of materials" (SBoM),</a:t>
-            </a:r>
-          </a:p>
-          <a:p>
-            <a:pPr>
-              <a:defRPr sz="2000"/>
-            </a:pPr>
-            <a:r>
-              <a:t>opslaan van artifacten,</a:t>
-            </a:r>
-          </a:p>
-          <a:p>
-            <a:pPr>
-              <a:defRPr sz="2000"/>
-            </a:pPr>
-            <a:r>
-              <a:t>registratie van incidenten bij gebruik en beheer, en</a:t>
-            </a:r>
-          </a:p>
-          <a:p>
-            <a:pPr>
-              <a:defRPr sz="2000"/>
-            </a:pPr>
-            <a:r>
-              <a:t>bij het uitvoeren van operationeel beheer; uitrollen van de software in de productieomgeving.</a:t>
+              <a:t>Voor vastgestelde taken bij het ontwikkelen, onderhouden en operationeel beheren van software, stelt ICTU het gebruik van tools verplicht. ICTU adviseert per taak specifieke tools en ondersteunt projecten bij het gebruik daarvan.</a:t>
             </a:r>
           </a:p>
         </p:txBody>

</xml_diff>

<commit_message>
Voeg kennis van KA toe aan M23. (#1017)
* Verwijzigingen naar OpenVAS verwijderd. (#1007)

Closes #949.

* Voeg template voor voortgang voorfase producten toe. (#986)

Closes #760.

* Voeg kennis van KA toe aan M23.

De titel van maatregel M23 is veranderd van "Het project zorgt voor de aanwezigheid van ervaring met de Kwaliteitsaanpak" naar "Het project zorgt voor de aanwezigheid van kennis van en ervaring met de Kwaliteitsaanpak". Aan de inhoud is toegevoegd dat nieuwe projectleden uitleg over de Kwaliteitsaanpak krijgen.

Closes #794.
</commit_message>
<xml_diff>
--- a/docs/wip/ICTU-Kwaliteitsaanpak.pptx
+++ b/docs/wip/ICTU-Kwaliteitsaanpak.pptx
@@ -21609,14 +21609,6 @@
               <a:defRPr sz="2000"/>
             </a:pPr>
             <a:r>
-              <a:t>controleren van de configuratie op aanwezigheid van bekende kwetsbaarheden,</a:t>
-            </a:r>
-          </a:p>
-          <a:p>
-            <a:pPr>
-              <a:defRPr sz="2000"/>
-            </a:pPr>
-            <a:r>
               <a:t>controleren van door de applicatie gebruikte versies van externe software op aanwezigheid van bekende kwetsbaarheden,</a:t>
             </a:r>
           </a:p>
@@ -22067,7 +22059,7 @@
               <a:defRPr sz="2400"/>
             </a:pPr>
             <a:r>
-              <a:t>M23: Het project zorgt voor de aanwezigheid van ervaring met de Kwaliteitsaanpak</a:t>
+              <a:t>M23: Het project zorgt voor de aanwezigheid van kennis van en ervaring met de Kwaliteitsaanpak</a:t>
             </a:r>
           </a:p>
         </p:txBody>
@@ -22095,7 +22087,7 @@
           <a:lstStyle/>
           <a:p>
             <a:r>
-              <a:t>De software delivery manager zorgt ervoor dat bij nieuwe projecten wordt gestart met ten minste twee projectleden die bekend zijn met de Kwaliteitsaanpak.</a:t>
+              <a:t>De software delivery manager zorgt ervoor dat bij nieuwe projecten wordt gestart met ten minste twee projectleden die bekend zijn met de Kwaliteitsaanpak. Projectleden die nog niet bekend zijn met de Kwaliteitsaanpak krijgen uitleg over de inhoud en achtergrond van de Kwaliteitsaanpak.</a:t>
             </a:r>
           </a:p>
         </p:txBody>

</xml_diff>

<commit_message>
937 duplicatie tussen m01 m07 en m16 oplossen (#1019)
In M16 de twee opsommingen gecombineerd in 1 tabel.

In M16 "Het project gebruikt tools voor vastgestelde taken" de opsomming van taken gecombineerd met de opsomming van tools in één tabel.

Closes #937.
</commit_message>
<xml_diff>
--- a/docs/wip/ICTU-Kwaliteitsaanpak.pptx
+++ b/docs/wip/ICTU-Kwaliteitsaanpak.pptx
@@ -21474,143 +21474,7 @@
           <a:lstStyle/>
           <a:p>
             <a:r>
-              <a:t>ICTU stelt het gebruik van tools verplicht voor de volgende taken:</a:t>
-            </a:r>
-          </a:p>
-          <a:p>
-            <a:pPr>
-              <a:defRPr sz="2000"/>
-            </a:pPr>
-            <a:r>
-              <a:t>product en sprint backlog management en agile werken,</a:t>
-            </a:r>
-          </a:p>
-          <a:p>
-            <a:pPr>
-              <a:defRPr sz="2000"/>
-            </a:pPr>
-            <a:r>
-              <a:t>inrichten en uitvoeren van een continuous delivery pipeline,</a:t>
-            </a:r>
-          </a:p>
-          <a:p>
-            <a:pPr>
-              <a:defRPr sz="2000"/>
-            </a:pPr>
-            <a:r>
-              <a:t>monitoren van de kwaliteit van broncode,</a:t>
-            </a:r>
-          </a:p>
-          <a:p>
-            <a:pPr>
-              <a:defRPr sz="2000"/>
-            </a:pPr>
-            <a:r>
-              <a:t>versiebeheer van op te leveren producten,</a:t>
-            </a:r>
-          </a:p>
-          <a:p>
-            <a:pPr>
-              <a:defRPr sz="2000"/>
-            </a:pPr>
-            <a:r>
-              <a:t>release van software,</a:t>
-            </a:r>
-          </a:p>
-          <a:p>
-            <a:pPr>
-              <a:defRPr sz="2000"/>
-            </a:pPr>
-            <a:r>
-              <a:t>maken van testrapportages,</a:t>
-            </a:r>
-          </a:p>
-          <a:p>
-            <a:pPr>
-              <a:defRPr sz="2000"/>
-            </a:pPr>
-            <a:r>
-              <a:t>maken van kwaliteitsrapportages,</a:t>
-            </a:r>
-          </a:p>
-          <a:p>
-            <a:pPr>
-              <a:defRPr sz="2000"/>
-            </a:pPr>
-            <a:r>
-              <a:t>controleren van door de applicatie gebruikte versies van externe software op aanwezigheid van bekende kwetsbaarheden,</a:t>
-            </a:r>
-          </a:p>
-          <a:p>
-            <a:pPr>
-              <a:defRPr sz="2000"/>
-            </a:pPr>
-            <a:r>
-              <a:t>statische controle van de software op aanwezigheid van kwetsbare constructies,</a:t>
-            </a:r>
-          </a:p>
-          <a:p>
-            <a:pPr>
-              <a:defRPr sz="2000"/>
-            </a:pPr>
-            <a:r>
-              <a:t>dynamische controle van de software op aanwezigheid van kwetsbare constructies,</a:t>
-            </a:r>
-          </a:p>
-          <a:p>
-            <a:pPr>
-              <a:defRPr sz="2000"/>
-            </a:pPr>
-            <a:r>
-              <a:t>controleren van container images op aanwezigheid van bekende kwetsbaarheden,</a:t>
-            </a:r>
-          </a:p>
-          <a:p>
-            <a:pPr>
-              <a:defRPr sz="2000"/>
-            </a:pPr>
-            <a:r>
-              <a:t>testen van performance en schaalbaarheid,</a:t>
-            </a:r>
-          </a:p>
-          <a:p>
-            <a:pPr>
-              <a:defRPr sz="2000"/>
-            </a:pPr>
-            <a:r>
-              <a:t>testen op toegankelijkheid van de applicatie,</a:t>
-            </a:r>
-          </a:p>
-          <a:p>
-            <a:pPr>
-              <a:defRPr sz="2000"/>
-            </a:pPr>
-            <a:r>
-              <a:t>produceren van een "software bill of materials" (SBoM),</a:t>
-            </a:r>
-          </a:p>
-          <a:p>
-            <a:pPr>
-              <a:defRPr sz="2000"/>
-            </a:pPr>
-            <a:r>
-              <a:t>opslaan van artifacten,</a:t>
-            </a:r>
-          </a:p>
-          <a:p>
-            <a:pPr>
-              <a:defRPr sz="2000"/>
-            </a:pPr>
-            <a:r>
-              <a:t>registratie van incidenten bij gebruik en beheer, en</a:t>
-            </a:r>
-          </a:p>
-          <a:p>
-            <a:pPr>
-              <a:defRPr sz="2000"/>
-            </a:pPr>
-            <a:r>
-              <a:t>bij het uitvoeren van operationeel beheer; uitrollen van de software in de productieomgeving.</a:t>
+              <a:t>Voor vastgestelde taken bij het ontwikkelen, onderhouden en operationeel beheren van software, stelt ICTU het gebruik van tools verplicht. ICTU adviseert per taak specifieke tools en ondersteunt projecten bij het gebruik daarvan.</a:t>
             </a:r>
           </a:p>
         </p:txBody>

</xml_diff>

<commit_message>
M13 over ISO-25010 is vervallen. (#1018)
* Voeg template voor voortgang voorfase producten toe. (#986)

Closes #760.

* M13 over ISO-25010 is vervallen.

Maatregel M13 "Het project gebruikt ISO-25010 voor de specificatie van productkwaliteitseisen" is vervallen. Het gebruik van ISO-25010 voor de specificatie van productkwaliteitseisen staat al genoemd in M01 "Het project levert in elke fase vastgestelde producten en informatie op".

Closes #950.
</commit_message>
<xml_diff>
--- a/docs/wip/ICTU-Kwaliteitsaanpak.pptx
+++ b/docs/wip/ICTU-Kwaliteitsaanpak.pptx
@@ -40,7 +40,6 @@
     <p:sldId id="284" r:id="rId41"/>
     <p:sldId id="285" r:id="rId42"/>
     <p:sldId id="286" r:id="rId43"/>
-    <p:sldId id="287" r:id="rId44"/>
   </p:sldIdLst>
   <p:sldSz cx="12192000" cy="6858000"/>
   <p:notesSz cx="6858000" cy="9144000"/>
@@ -21306,7 +21305,7 @@
               <a:defRPr sz="2400"/>
             </a:pPr>
             <a:r>
-              <a:t>M04: Het project borgt de correcte werking van het product met geautomatiseerde regressietests</a:t>
+              <a:t>M07: Het project gebruikt een continuous delivery pipeline om het product te bouwen, testen en op te leveren</a:t>
             </a:r>
           </a:p>
         </p:txBody>
@@ -21334,7 +21333,7 @@
           <a:lstStyle/>
           <a:p>
             <a:r>
-              <a:t>Regressietests - tests die verifiëren of eerder ontwikkelde software nog steeds correct werkt na wijzigingen in de software of aansluiting op andere externe koppelvlakken - zijn geautomatiseerd.</a:t>
+              <a:t>Er is een geautomatiseerde continuous delivery pipeline die aantoonbaar correct werkt en de software bouwt, installeert in de testomgevingen, test op functionele en niet-functionele eigenschappen en oplevert, al dan niet inclusief installatie in de productieomgeving.</a:t>
             </a:r>
           </a:p>
         </p:txBody>
@@ -21376,7 +21375,7 @@
               <a:defRPr sz="2400"/>
             </a:pPr>
             <a:r>
-              <a:t>M07: Het project gebruikt een continuous delivery pipeline om het product te bouwen, testen en op te leveren</a:t>
+              <a:t>M16: Het project gebruikt tools voor vastgestelde taken</a:t>
             </a:r>
           </a:p>
         </p:txBody>
@@ -21404,7 +21403,7 @@
           <a:lstStyle/>
           <a:p>
             <a:r>
-              <a:t>Er is een geautomatiseerde continuous delivery pipeline die aantoonbaar correct werkt en de software bouwt, installeert in de testomgevingen, test op functionele en niet-functionele eigenschappen en oplevert, al dan niet inclusief installatie in de productieomgeving.</a:t>
+              <a:t>Voor vastgestelde taken bij het ontwikkelen, onderhouden en operationeel beheren van software, stelt ICTU het gebruik van tools verplicht. ICTU adviseert per taak specifieke tools en ondersteunt projecten bij het gebruik daarvan.</a:t>
             </a:r>
           </a:p>
         </p:txBody>
@@ -21446,7 +21445,7 @@
               <a:defRPr sz="2400"/>
             </a:pPr>
             <a:r>
-              <a:t>M16: Het project gebruikt tools voor vastgestelde taken</a:t>
+              <a:t>M08: Het project maakt technische schuld inzichtelijk en lost deze planmatig op</a:t>
             </a:r>
           </a:p>
         </p:txBody>
@@ -21474,7 +21473,7 @@
           <a:lstStyle/>
           <a:p>
             <a:r>
-              <a:t>Voor vastgestelde taken bij het ontwikkelen, onderhouden en operationeel beheren van software, stelt ICTU het gebruik van tools verplicht. ICTU adviseert per taak specifieke tools en ondersteunt projecten bij het gebruik daarvan.</a:t>
+              <a:t>Technische schuld is inzichtelijk en wordt planmatig aangepakt. De kwaliteitsmanager is verantwoordelijk voor het inzichtelijk maken van de technische schuld. De software delivery manager is verantwoordelijk voor het planmatig aanpakken van de technische schuld en zorgt dat het Scrumteam regelmatig en voldoende tijd heeft om technische schuld te voorkomen en op te lossen. Het Scrumteam is verantwoordelijk voor het zoveel mogelijk voorkomen van technische schuld en voor het identificeren van technische schuld die toch optreedt.</a:t>
             </a:r>
           </a:p>
         </p:txBody>
@@ -21516,7 +21515,7 @@
               <a:defRPr sz="2400"/>
             </a:pPr>
             <a:r>
-              <a:t>M08: Het project maakt technische schuld inzichtelijk en lost deze planmatig op</a:t>
+              <a:t>M26: Het project laat de beveiliging van het ontwikkelde product periodiek beoordelen</a:t>
             </a:r>
           </a:p>
         </p:txBody>
@@ -21544,7 +21543,7 @@
           <a:lstStyle/>
           <a:p>
             <a:r>
-              <a:t>Technische schuld is inzichtelijk en wordt planmatig aangepakt. De kwaliteitsmanager is verantwoordelijk voor het inzichtelijk maken van de technische schuld. De software delivery manager is verantwoordelijk voor het planmatig aanpakken van de technische schuld en zorgt dat het Scrumteam regelmatig en voldoende tijd heeft om technische schuld te voorkomen en op te lossen. Het Scrumteam is verantwoordelijk voor het zoveel mogelijk voorkomen van technische schuld en voor het identificeren van technische schuld die toch optreedt.</a:t>
+              <a:t>Projecten laten periodiek de beveiliging van de ontwikkelde software beoordelen. Een beveiligingsexpert onderzoekt de code zowel geautomatiseerd als handmatig op veelvoorkomende kwetsbaarheden en op het voldoen aan voorgeschreven beveiligingsnormen. Overheidsspecifieke beveiligingsnormen of -raamwerken, zoals de BIO (Baseline Informatiebeveiliging Overheid), bieden een basis voor de beoordeling. Bevindingen uit de beveiligingstest worden vastgelegd als onderdeel van de werkvoorraad voor het ontwikkelproces.</a:t>
             </a:r>
           </a:p>
         </p:txBody>
@@ -21582,41 +21581,27 @@
           <a:bodyPr/>
           <a:lstStyle/>
           <a:p>
-            <a:pPr>
-              <a:defRPr sz="2400"/>
-            </a:pPr>
             <a:r>
-              <a:t>M26: Het project laat de beveiliging van het ontwikkelde product periodiek beoordelen</a:t>
+              <a:t>Processen</a:t>
             </a:r>
           </a:p>
         </p:txBody>
       </p:sp>
       <p:sp>
         <p:nvSpPr>
-          <p:cNvPr id="3" name="TextBox 2"/>
-          <p:cNvSpPr txBox="1"/>
-          <p:nvPr/>
-        </p:nvSpPr>
-        <p:spPr>
-          <a:xfrm>
-            <a:off x="640080" y="1463040"/>
-            <a:ext cx="10972800" cy="5486400"/>
-          </a:xfrm>
-          <a:prstGeom prst="rect">
-            <a:avLst/>
-          </a:prstGeom>
-          <a:noFill/>
-        </p:spPr>
-        <p:txBody>
-          <a:bodyPr wrap="square">
-            <a:spAutoFit/>
-          </a:bodyPr>
+          <p:cNvPr id="3" name="Text Placeholder 2"/>
+          <p:cNvSpPr>
+            <a:spLocks noGrp="1"/>
+          </p:cNvSpPr>
+          <p:nvPr>
+            <p:ph type="body" idx="10" sz="quarter"/>
+          </p:nvPr>
+        </p:nvSpPr>
+        <p:spPr/>
+        <p:txBody>
+          <a:bodyPr/>
           <a:lstStyle/>
-          <a:p>
-            <a:r>
-              <a:t>Projecten laten periodiek de beveiliging van de ontwikkelde software beoordelen. Een beveiligingsexpert onderzoekt de code zowel geautomatiseerd als handmatig op veelvoorkomende kwetsbaarheden en op het voldoen aan voorgeschreven beveiligingsnormen. Overheidsspecifieke beveiligingsnormen of -raamwerken, zoals de BIO (Baseline Informatiebeveiliging Overheid), bieden een basis voor de beoordeling. Bevindingen uit de beveiligingstest worden vastgelegd als onderdeel van de werkvoorraad voor het ontwikkelproces.</a:t>
-            </a:r>
-          </a:p>
+          <a:p/>
         </p:txBody>
       </p:sp>
     </p:spTree>
@@ -21652,27 +21637,41 @@
           <a:bodyPr/>
           <a:lstStyle/>
           <a:p>
+            <a:pPr>
+              <a:defRPr sz="2400"/>
+            </a:pPr>
             <a:r>
-              <a:t>Processen</a:t>
+              <a:t>M14: Het project bereidt samen met opdrachtgevende organisatie en betrokken partijen de realisatie voor</a:t>
             </a:r>
           </a:p>
         </p:txBody>
       </p:sp>
       <p:sp>
         <p:nvSpPr>
-          <p:cNvPr id="3" name="Text Placeholder 2"/>
-          <p:cNvSpPr>
-            <a:spLocks noGrp="1"/>
-          </p:cNvSpPr>
-          <p:nvPr>
-            <p:ph type="body" idx="10" sz="quarter"/>
-          </p:nvPr>
-        </p:nvSpPr>
-        <p:spPr/>
-        <p:txBody>
-          <a:bodyPr/>
+          <p:cNvPr id="3" name="TextBox 2"/>
+          <p:cNvSpPr txBox="1"/>
+          <p:nvPr/>
+        </p:nvSpPr>
+        <p:spPr>
+          <a:xfrm>
+            <a:off x="640080" y="1463040"/>
+            <a:ext cx="10972800" cy="5486400"/>
+          </a:xfrm>
+          <a:prstGeom prst="rect">
+            <a:avLst/>
+          </a:prstGeom>
+          <a:noFill/>
+        </p:spPr>
+        <p:txBody>
+          <a:bodyPr wrap="square">
+            <a:spAutoFit/>
+          </a:bodyPr>
           <a:lstStyle/>
-          <a:p/>
+          <a:p>
+            <a:r>
+              <a:t>Projecten hebben een voorbereidingsfase, "voorfase" genoemd, voorafgaand aan de realisatiefase. Voor het uitvoeren van de voorfase zijn vertegenwoordigers van de opdrachtgevende organisatie, de beoogde beheerorganisatie en andere partijen betrokken die meewerken aan het realiseren van een deel van de op te leveren producten. Het doel van de voorfase is beeld krijgen van de te realiseren oplossing, van de risico's die zich tijdens realisatie kunnen voordoen en van de kaders waarbinnen de oplossing moet passen; tijdens de realisatiefase vinden bouw en onderhoud van de software en actualiseren en afronden van documentatie plaats.</a:t>
+            </a:r>
+          </a:p>
         </p:txBody>
       </p:sp>
     </p:spTree>
@@ -21712,7 +21711,7 @@
               <a:defRPr sz="2400"/>
             </a:pPr>
             <a:r>
-              <a:t>M14: Het project bereidt samen met opdrachtgevende organisatie en betrokken partijen de realisatie voor</a:t>
+              <a:t>M21: Het project selecteert medewerkers op basis van kwaliteit</a:t>
             </a:r>
           </a:p>
         </p:txBody>
@@ -21740,7 +21739,7 @@
           <a:lstStyle/>
           <a:p>
             <a:r>
-              <a:t>Projecten hebben een voorbereidingsfase, "voorfase" genoemd, voorafgaand aan de realisatiefase. Voor het uitvoeren van de voorfase zijn vertegenwoordigers van de opdrachtgevende organisatie, de beoogde beheerorganisatie en andere partijen betrokken die meewerken aan het realiseren van een deel van de op te leveren producten. Het doel van de voorfase is beeld krijgen van de te realiseren oplossing, van de risico's die zich tijdens realisatie kunnen voordoen en van de kaders waarbinnen de oplossing moet passen; tijdens de realisatiefase vinden bouw en onderhoud van de software en actualiseren en afronden van documentatie plaats.</a:t>
+              <a:t>Bij de inzet van medewerkers gaat kwaliteit boven andere aspecten, zoals beschikbaarheid, prijs en doorlooptijd.</a:t>
             </a:r>
           </a:p>
         </p:txBody>
@@ -21782,7 +21781,7 @@
               <a:defRPr sz="2400"/>
             </a:pPr>
             <a:r>
-              <a:t>M21: Het project selecteert medewerkers op basis van kwaliteit</a:t>
+              <a:t>M23: Het project zorgt voor de aanwezigheid van kennis van en ervaring met de Kwaliteitsaanpak</a:t>
             </a:r>
           </a:p>
         </p:txBody>
@@ -21810,7 +21809,7 @@
           <a:lstStyle/>
           <a:p>
             <a:r>
-              <a:t>Bij de inzet van medewerkers gaat kwaliteit boven andere aspecten, zoals beschikbaarheid, prijs en doorlooptijd.</a:t>
+              <a:t>De software delivery manager zorgt ervoor dat bij nieuwe projecten wordt gestart met ten minste twee projectleden die bekend zijn met de Kwaliteitsaanpak. Projectleden die nog niet bekend zijn met de Kwaliteitsaanpak krijgen uitleg over de inhoud en achtergrond van de Kwaliteitsaanpak.</a:t>
             </a:r>
           </a:p>
         </p:txBody>
@@ -21852,7 +21851,7 @@
               <a:defRPr sz="2400"/>
             </a:pPr>
             <a:r>
-              <a:t>M23: Het project zorgt voor de aanwezigheid van kennis van en ervaring met de Kwaliteitsaanpak</a:t>
+              <a:t>M05: Het project hanteert een iteratief en incrementeel ontwikkelproces</a:t>
             </a:r>
           </a:p>
         </p:txBody>
@@ -21880,7 +21879,7 @@
           <a:lstStyle/>
           <a:p>
             <a:r>
-              <a:t>De software delivery manager zorgt ervoor dat bij nieuwe projecten wordt gestart met ten minste twee projectleden die bekend zijn met de Kwaliteitsaanpak. Projectleden die nog niet bekend zijn met de Kwaliteitsaanpak krijgen uitleg over de inhoud en achtergrond van de Kwaliteitsaanpak.</a:t>
+              <a:t>Projecten werken iteratief en incrementeel; dit betekent dat een project in korte iteraties werkt, waarbij elke iteratie een werkende versie van de software oplevert die extra waarde vertegenwoordigt voor de opdrachtgevende organisatie. Behalve de software werkt het project ook iedere iteratie alle andere producten bij. Elke iteratie worden verwachtingen en werkelijke resultaten vergeleken en wordt de werkwijze aangescherpt op basis van inzichten en bevindingen.</a:t>
             </a:r>
           </a:p>
         </p:txBody>
@@ -21922,7 +21921,7 @@
               <a:defRPr sz="2400"/>
             </a:pPr>
             <a:r>
-              <a:t>M05: Het project hanteert een iteratief en incrementeel ontwikkelproces</a:t>
+              <a:t>M35: Het project hanteert een agile architectuuraanpak</a:t>
             </a:r>
           </a:p>
         </p:txBody>
@@ -21950,7 +21949,7 @@
           <a:lstStyle/>
           <a:p>
             <a:r>
-              <a:t>Projecten werken iteratief en incrementeel; dit betekent dat een project in korte iteraties werkt, waarbij elke iteratie een werkende versie van de software oplevert die extra waarde vertegenwoordigt voor de opdrachtgevende organisatie. Behalve de software werkt het project ook iedere iteratie alle andere producten bij. Elke iteratie worden verwachtingen en werkelijke resultaten vergeleken en wordt de werkwijze aangescherpt op basis van inzichten en bevindingen.</a:t>
+              <a:t>Tijdens de voorfase verwerkt het project de door de opdrachtgevende organisatie opgestelde projectstartarchitectuur (PSA) in een eerste versie van het softwarearchitectuurdocument (SAD). Tijdens de realisatiefase werkt het project het SAD bij op basis van nieuwe inzichten.</a:t>
             </a:r>
           </a:p>
         </p:txBody>
@@ -22073,7 +22072,7 @@
               <a:defRPr sz="2400"/>
             </a:pPr>
             <a:r>
-              <a:t>M35: Het project hanteert een agile architectuuraanpak</a:t>
+              <a:t>M10: Het project kent een wekelijks projectoverleg</a:t>
             </a:r>
           </a:p>
         </p:txBody>
@@ -22101,7 +22100,7 @@
           <a:lstStyle/>
           <a:p>
             <a:r>
-              <a:t>Tijdens de voorfase verwerkt het project de door de opdrachtgevende organisatie opgestelde projectstartarchitectuur (PSA) in een eerste versie van het softwarearchitectuurdocument (SAD). Tijdens de realisatiefase werkt het project het SAD bij op basis van nieuwe inzichten.</a:t>
+              <a:t>De projectleider organiseert een periodiek projectoverleg. Dit overleg vindt wekelijks plaats en duurt niet langer dan een uur. Vereiste aanwezigen zijn de projectleider, de software delivery manager, de Scrummaster, een vertegenwoordiger uit elk van de Scrumteams en de kwaliteitsmanager van het project; andere aanwezigen kunnen zijn: de projectarchitect en de product owner. De agenda voor dit overleg bestaat ten minste uit de volgende onderwerpen: mededelingen, actie- en besluitenlijst, personele zaken, planning en voortgang, kwaliteit en architectuur, risico's en aandachtspunten.</a:t>
             </a:r>
           </a:p>
         </p:txBody>
@@ -22143,7 +22142,7 @@
               <a:defRPr sz="2400"/>
             </a:pPr>
             <a:r>
-              <a:t>M10: Het project kent een wekelijks projectoverleg</a:t>
+              <a:t>M28: Het project voert periodiek een self-assessment uit tegen de actuele versie van de Kwaliteitsaanpak</a:t>
             </a:r>
           </a:p>
         </p:txBody>
@@ -22171,7 +22170,7 @@
           <a:lstStyle/>
           <a:p>
             <a:r>
-              <a:t>De projectleider organiseert een periodiek projectoverleg. Dit overleg vindt wekelijks plaats en duurt niet langer dan een uur. Vereiste aanwezigen zijn de projectleider, de software delivery manager, de Scrummaster, een vertegenwoordiger uit elk van de Scrumteams en de kwaliteitsmanager van het project; andere aanwezigen kunnen zijn: de projectarchitect en de product owner. De agenda voor dit overleg bestaat ten minste uit de volgende onderwerpen: mededelingen, actie- en besluitenlijst, personele zaken, planning en voortgang, kwaliteit en architectuur, risico's en aandachtspunten.</a:t>
+              <a:t>De projectleider organiseert periodiek een self-assessment tegen de actuele versie van de Kwaliteitsaanpak en zet verbeteracties uit, waar nodig.</a:t>
             </a:r>
           </a:p>
         </p:txBody>
@@ -22213,7 +22212,7 @@
               <a:defRPr sz="2400"/>
             </a:pPr>
             <a:r>
-              <a:t>M28: Het project voert periodiek een self-assessment uit tegen de actuele versie van de Kwaliteitsaanpak</a:t>
+              <a:t>M30: Het project identificeert, mitigeert en bewaakt risico's</a:t>
             </a:r>
           </a:p>
         </p:txBody>
@@ -22241,7 +22240,7 @@
           <a:lstStyle/>
           <a:p>
             <a:r>
-              <a:t>De projectleider organiseert periodiek een self-assessment tegen de actuele versie van de Kwaliteitsaanpak en zet verbeteracties uit, waar nodig.</a:t>
+              <a:t>Het project identificeert, mitigeert en bewaakt projectspecifieke risico's voorafgaand aan en tijdens de projectuitvoering. Het project houdt een risicolog bij met geïdentificeerde risico's. De uitkomsten van de "Doordacht-van-Start-sessie", die al voorafgaand aan de start van het project wordt uitgevoerd, vormen het startpunt van deze risicolog. Risico's die tijdens de voorfase worden geïdentificeerd, bijvoorbeeld bij de productrisicoanalyse, worden toegevoegd aan de risicolog. Ook bij de start van de realisatiefase worden risicosessies gehouden met (vertegenwoordigers van) de belanghebbenden om verdere risico's te identificeren. Het project identificeert en implementeert mitigerende maatregelen danwel accepteert expliciet de geïdentificeerde risico's. Het project bewaakt de risicolog en uitvoering van de mitigerende maatregelen tijdens het IPO.</a:t>
             </a:r>
           </a:p>
         </p:txBody>
@@ -22283,7 +22282,7 @@
               <a:defRPr sz="2400"/>
             </a:pPr>
             <a:r>
-              <a:t>M30: Het project identificeert, mitigeert en bewaakt risico's</a:t>
+              <a:t>M34: Het project draagt software beheerst over</a:t>
             </a:r>
           </a:p>
         </p:txBody>
@@ -22311,7 +22310,7 @@
           <a:lstStyle/>
           <a:p>
             <a:r>
-              <a:t>Het project identificeert, mitigeert en bewaakt projectspecifieke risico's voorafgaand aan en tijdens de projectuitvoering. Het project houdt een risicolog bij met geïdentificeerde risico's. De uitkomsten van de "Doordacht-van-Start-sessie", die al voorafgaand aan de start van het project wordt uitgevoerd, vormen het startpunt van deze risicolog. Risico's die tijdens de voorfase worden geïdentificeerd, bijvoorbeeld bij de productrisicoanalyse, worden toegevoegd aan de risicolog. Ook bij de start van de realisatiefase worden risicosessies gehouden met (vertegenwoordigers van) de belanghebbenden om verdere risico's te identificeren. Het project identificeert en implementeert mitigerende maatregelen danwel accepteert expliciet de geïdentificeerde risico's. Het project bewaakt de risicolog en uitvoering van de mitigerende maatregelen tijdens het IPO.</a:t>
+              <a:t>Als de software op enig moment door een andere partij dan ICTU verder ontwikkeld en/of onderhouden zal worden, draagt het project zorg voor een beheerste overdracht. Beheerdocumentatie, broncode en testmiddelen zijn van dusdanige kwaliteit en compleetheid dat de andere partij de software efficiënt en effectief kan doorontwikkelen en/of onderhouden.</a:t>
             </a:r>
           </a:p>
         </p:txBody>
@@ -22353,7 +22352,7 @@
               <a:defRPr sz="2400"/>
             </a:pPr>
             <a:r>
-              <a:t>M34: Het project draagt software beheerst over</a:t>
+              <a:t>M27: Het project sluit projectfasen en zichzelf expliciet af</a:t>
             </a:r>
           </a:p>
         </p:txBody>
@@ -22381,7 +22380,7 @@
           <a:lstStyle/>
           <a:p>
             <a:r>
-              <a:t>Als de software op enig moment door een andere partij dan ICTU verder ontwikkeld en/of onderhouden zal worden, draagt het project zorg voor een beheerste overdracht. Beheerdocumentatie, broncode en testmiddelen zijn van dusdanige kwaliteit en compleetheid dat de andere partij de software efficiënt en effectief kan doorontwikkelen en/of onderhouden.</a:t>
+              <a:t>Afsluiting van een projectfase gebeurt expliciet en gecontroleerd: alle producten, zoals documentatie, broncode, referentiedata en credentials, die in de af te sluiten fase nodig waren of zijn opgeleverd, worden gearchiveerd. Indien er geen volgende fase is voorzien op korte termijn, dienen alle producten van de laptops van de projectmedewerkers verwijderd te worden.</a:t>
             </a:r>
           </a:p>
         </p:txBody>
@@ -22419,41 +22418,27 @@
           <a:bodyPr/>
           <a:lstStyle/>
           <a:p>
-            <a:pPr>
-              <a:defRPr sz="2400"/>
-            </a:pPr>
             <a:r>
-              <a:t>M27: Het project sluit projectfasen en zichzelf expliciet af</a:t>
+              <a:t>Organisatie</a:t>
             </a:r>
           </a:p>
         </p:txBody>
       </p:sp>
       <p:sp>
         <p:nvSpPr>
-          <p:cNvPr id="3" name="TextBox 2"/>
-          <p:cNvSpPr txBox="1"/>
-          <p:nvPr/>
-        </p:nvSpPr>
-        <p:spPr>
-          <a:xfrm>
-            <a:off x="640080" y="1463040"/>
-            <a:ext cx="10972800" cy="5486400"/>
-          </a:xfrm>
-          <a:prstGeom prst="rect">
-            <a:avLst/>
-          </a:prstGeom>
-          <a:noFill/>
-        </p:spPr>
-        <p:txBody>
-          <a:bodyPr wrap="square">
-            <a:spAutoFit/>
-          </a:bodyPr>
+          <p:cNvPr id="3" name="Text Placeholder 2"/>
+          <p:cNvSpPr>
+            <a:spLocks noGrp="1"/>
+          </p:cNvSpPr>
+          <p:nvPr>
+            <p:ph type="body" idx="10" sz="quarter"/>
+          </p:nvPr>
+        </p:nvSpPr>
+        <p:spPr/>
+        <p:txBody>
+          <a:bodyPr/>
           <a:lstStyle/>
-          <a:p>
-            <a:r>
-              <a:t>Afsluiting van een projectfase gebeurt expliciet en gecontroleerd: alle producten, zoals documentatie, broncode, referentiedata en credentials, die in de af te sluiten fase nodig waren of zijn opgeleverd, worden gearchiveerd. Indien er geen volgende fase is voorzien op korte termijn, dienen alle producten van de laptops van de projectmedewerkers verwijderd te worden.</a:t>
-            </a:r>
-          </a:p>
+          <a:p/>
         </p:txBody>
       </p:sp>
     </p:spTree>
@@ -22489,27 +22474,41 @@
           <a:bodyPr/>
           <a:lstStyle/>
           <a:p>
+            <a:pPr>
+              <a:defRPr sz="2400"/>
+            </a:pPr>
             <a:r>
-              <a:t>Organisatie</a:t>
+              <a:t>M29: ICTU organiseert voor aanvang van een project de interne dienstverlening</a:t>
             </a:r>
           </a:p>
         </p:txBody>
       </p:sp>
       <p:sp>
         <p:nvSpPr>
-          <p:cNvPr id="3" name="Text Placeholder 2"/>
-          <p:cNvSpPr>
-            <a:spLocks noGrp="1"/>
-          </p:cNvSpPr>
-          <p:nvPr>
-            <p:ph type="body" idx="10" sz="quarter"/>
-          </p:nvPr>
-        </p:nvSpPr>
-        <p:spPr/>
-        <p:txBody>
-          <a:bodyPr/>
+          <p:cNvPr id="3" name="TextBox 2"/>
+          <p:cNvSpPr txBox="1"/>
+          <p:nvPr/>
+        </p:nvSpPr>
+        <p:spPr>
+          <a:xfrm>
+            <a:off x="640080" y="1463040"/>
+            <a:ext cx="10972800" cy="5486400"/>
+          </a:xfrm>
+          <a:prstGeom prst="rect">
+            <a:avLst/>
+          </a:prstGeom>
+          <a:noFill/>
+        </p:spPr>
+        <p:txBody>
+          <a:bodyPr wrap="square">
+            <a:spAutoFit/>
+          </a:bodyPr>
           <a:lstStyle/>
-          <a:p/>
+          <a:p>
+            <a:r>
+              <a:t>Voordat ICTU een softwareontwikkelproject start, dat gaat werken conform de Kwaliteitsaanpak, maakt de beoogde ICTU-projectleider afspraken met de afdelingen ICTU Software Diensten (ISD) en ICTU Software Expertise (ISE) over de af te nemen dienstverlening.</a:t>
+            </a:r>
+          </a:p>
         </p:txBody>
       </p:sp>
     </p:spTree>
@@ -22549,7 +22548,7 @@
               <a:defRPr sz="2400"/>
             </a:pPr>
             <a:r>
-              <a:t>M29: ICTU organiseert voor aanvang van een project de interne dienstverlening</a:t>
+              <a:t>M19: ICTU biedt projecten een afgeschermde digitale omgeving</a:t>
             </a:r>
           </a:p>
         </p:txBody>
@@ -22577,7 +22576,7 @@
           <a:lstStyle/>
           <a:p>
             <a:r>
-              <a:t>Voordat ICTU een softwareontwikkelproject start, dat gaat werken conform de Kwaliteitsaanpak, maakt de beoogde ICTU-projectleider afspraken met de afdelingen ICTU Software Diensten (ISD) en ICTU Software Expertise (ISE) over de af te nemen dienstverlening.</a:t>
+              <a:t>ICTU geeft de projecten de beschikking over eigen, afgeschermde digitale omgevingen, waarbinnen ze de door het project ontwikkelde software en tools kunnen installeren en waartoe op een beheerste manier toegang wordt verleend.</a:t>
             </a:r>
           </a:p>
         </p:txBody>
@@ -22619,7 +22618,7 @@
               <a:defRPr sz="2400"/>
             </a:pPr>
             <a:r>
-              <a:t>M19: ICTU biedt projecten een afgeschermde digitale omgeving</a:t>
+              <a:t>M18: ICTU biedt ondersteuning voor verplicht gestelde tools</a:t>
             </a:r>
           </a:p>
         </p:txBody>
@@ -22647,7 +22646,7 @@
           <a:lstStyle/>
           <a:p>
             <a:r>
-              <a:t>ICTU geeft de projecten de beschikking over eigen, afgeschermde digitale omgevingen, waarbinnen ze de door het project ontwikkelde software en tools kunnen installeren en waartoe op een beheerste manier toegang wordt verleend.</a:t>
+              <a:t>ICTU zorgt voor technische en functionele ondersteuning aan projecten bij het gebruik van alle verplichte tools.</a:t>
             </a:r>
           </a:p>
         </p:txBody>
@@ -22689,7 +22688,7 @@
               <a:defRPr sz="2400"/>
             </a:pPr>
             <a:r>
-              <a:t>M18: ICTU biedt ondersteuning voor verplicht gestelde tools</a:t>
+              <a:t>M11: ICTU beheert, onderhoudt en implementeert de Kwaliteitsaanpak en kwaliteitsnormen</a:t>
             </a:r>
           </a:p>
         </p:txBody>
@@ -22717,7 +22716,7 @@
           <a:lstStyle/>
           <a:p>
             <a:r>
-              <a:t>ICTU zorgt voor technische en functionele ondersteuning aan projecten bij het gebruik van alle verplichte tools.</a:t>
+              <a:t>ICTU beheert, onderhoudt en implementeert de Kwaliteitsaanpak en de kwaliteitsnormen. Aanpassingen zijn gebaseerd op praktijkervaring, nieuwe inzichten en nieuwe mogelijkheden voor meting en analyse. Iedere medewerker kan wijzigingsvoorstellen indienen bij ICTU. ICTU behandelt de wijzigingsvoorstellen, kiest de te nemen actie bij elk wijzigingsvoorstel en legt de wijzigingsvoorstellen en besluiten vast.</a:t>
             </a:r>
           </a:p>
         </p:txBody>
@@ -22832,7 +22831,7 @@
               <a:defRPr sz="2400"/>
             </a:pPr>
             <a:r>
-              <a:t>M11: ICTU beheert, onderhoudt en implementeert de Kwaliteitsaanpak en kwaliteitsnormen</a:t>
+              <a:t>M12: ICTU publiceert nieuwe versies van de Kwaliteitsaanpak en normen periodiek en op een vaste locatie</a:t>
             </a:r>
           </a:p>
         </p:txBody>
@@ -22860,7 +22859,7 @@
           <a:lstStyle/>
           <a:p>
             <a:r>
-              <a:t>ICTU beheert, onderhoudt en implementeert de Kwaliteitsaanpak en de kwaliteitsnormen. Aanpassingen zijn gebaseerd op praktijkervaring, nieuwe inzichten en nieuwe mogelijkheden voor meting en analyse. Iedere medewerker kan wijzigingsvoorstellen indienen bij ICTU. ICTU behandelt de wijzigingsvoorstellen, kiest de te nemen actie bij elk wijzigingsvoorstel en legt de wijzigingsvoorstellen en besluiten vast.</a:t>
+              <a:t>ICTU publiceert periodiek een nieuwe versie van de Kwaliteitsaanpak en/of de kwaliteitsnormen op een vaste, bekende locatie.</a:t>
             </a:r>
           </a:p>
         </p:txBody>
@@ -22902,76 +22901,6 @@
               <a:defRPr sz="2400"/>
             </a:pPr>
             <a:r>
-              <a:t>M12: ICTU publiceert nieuwe versies van de Kwaliteitsaanpak en normen periodiek en op een vaste locatie</a:t>
-            </a:r>
-          </a:p>
-        </p:txBody>
-      </p:sp>
-      <p:sp>
-        <p:nvSpPr>
-          <p:cNvPr id="3" name="TextBox 2"/>
-          <p:cNvSpPr txBox="1"/>
-          <p:nvPr/>
-        </p:nvSpPr>
-        <p:spPr>
-          <a:xfrm>
-            <a:off x="640080" y="1463040"/>
-            <a:ext cx="10972800" cy="5486400"/>
-          </a:xfrm>
-          <a:prstGeom prst="rect">
-            <a:avLst/>
-          </a:prstGeom>
-          <a:noFill/>
-        </p:spPr>
-        <p:txBody>
-          <a:bodyPr wrap="square">
-            <a:spAutoFit/>
-          </a:bodyPr>
-          <a:lstStyle/>
-          <a:p>
-            <a:r>
-              <a:t>ICTU publiceert periodiek een nieuwe versie van de Kwaliteitsaanpak en/of de kwaliteitsnormen op een vaste, bekende locatie.</a:t>
-            </a:r>
-          </a:p>
-        </p:txBody>
-      </p:sp>
-    </p:spTree>
-  </p:cSld>
-  <p:clrMapOvr>
-    <a:masterClrMapping/>
-  </p:clrMapOvr>
-</p:sld>
-</file>
-
-<file path=ppt/slides/slide32.xml><?xml version="1.0" encoding="utf-8"?>
-<p:sld xmlns:a="http://schemas.openxmlformats.org/drawingml/2006/main" xmlns:p="http://schemas.openxmlformats.org/presentationml/2006/main" xmlns:r="http://schemas.openxmlformats.org/officeDocument/2006/relationships">
-  <p:cSld>
-    <p:spTree>
-      <p:nvGrpSpPr>
-        <p:cNvPr id="1" name=""/>
-        <p:cNvGrpSpPr/>
-        <p:nvPr/>
-      </p:nvGrpSpPr>
-      <p:grpSpPr/>
-      <p:sp>
-        <p:nvSpPr>
-          <p:cNvPr id="2" name="Title 1"/>
-          <p:cNvSpPr>
-            <a:spLocks noGrp="1"/>
-          </p:cNvSpPr>
-          <p:nvPr>
-            <p:ph type="title"/>
-          </p:nvPr>
-        </p:nvSpPr>
-        <p:spPr/>
-        <p:txBody>
-          <a:bodyPr/>
-          <a:lstStyle/>
-          <a:p>
-            <a:pPr>
-              <a:defRPr sz="2400"/>
-            </a:pPr>
-            <a:r>
               <a:t>M33: ICTU organiseert periodiek een gezamenlijke self-assessment ten aanzien van de Kwaliteitsaanpak</a:t>
             </a:r>
           </a:p>
@@ -23378,7 +23307,7 @@
               <a:defRPr sz="2400"/>
             </a:pPr>
             <a:r>
-              <a:t>M13: Het project gebruikt ISO-25010 voor de specificatie van productkwaliteitseisen</a:t>
+              <a:t>M04: Het project borgt de correcte werking van het product met geautomatiseerde regressietests</a:t>
             </a:r>
           </a:p>
         </p:txBody>
@@ -23406,7 +23335,7 @@
           <a:lstStyle/>
           <a:p>
             <a:r>
-              <a:t>Voor specificatie en documentatie van vereiste en gewenste kwaliteitseigenschappen, de niet-functionele eisen, maken projecten gebruik van de terminologie en categorisering uit NEN-ISO/IEC 25010:2023. Projecten gebruiken NEN-ISO/IEC 25010:2023 om te controleren of alle relevante kwaliteitseigenschappen van het op te leveren eindproduct worden meegenomen in de ontwikkeling en/of onderhoud van het product.</a:t>
+              <a:t>Regressietests - tests die verifiëren of eerder ontwikkelde software nog steeds correct werkt na wijzigingen in de software of aansluiting op andere externe koppelvlakken - zijn geautomatiseerd.</a:t>
             </a:r>
           </a:p>
         </p:txBody>

</xml_diff>

<commit_message>
Mark measure and submeasure titles in the XML
</commit_message>
<xml_diff>
--- a/docs/wip/ICTU-Kwaliteitsaanpak.pptx
+++ b/docs/wip/ICTU-Kwaliteitsaanpak.pptx
@@ -21263,7 +21263,7 @@
               <a:buNone/>
             </a:pPr>
             <a:r>
-              <a:t>Versie wip, 11-04-2025</a:t>
+              <a:t>Versie wip, 22-09-2025</a:t>
             </a:r>
           </a:p>
         </p:txBody>
@@ -21809,7 +21809,7 @@
           <a:lstStyle/>
           <a:p>
             <a:r>
-              <a:t>De software delivery manager zorgt ervoor dat bij nieuwe projecten wordt gestart met ten minste twee projectleden die bekend zijn met de Kwaliteitsaanpak. Projectleden die nog niet bekend zijn met de Kwaliteitsaanpak krijgen uitleg over de inhoud en achtergrond van de Kwaliteitsaanpak.</a:t>
+              <a:t>De software delivery manager zorgt ervoor dat bij nieuwe projecten wordt gestart met ten minste twee projectleden die bekend zijn met de Kwaliteitsaanpak. Projectleden, inclusief projectleider, die nog niet bekend zijn met de Kwaliteitsaanpak krijgen uitleg over de inhoud en achtergrond van de Kwaliteitsaanpak.</a:t>
             </a:r>
           </a:p>
         </p:txBody>

</xml_diff>